<commit_message>
added new machine learning references.
</commit_message>
<xml_diff>
--- a/Lectures/IF5030 Manajemen Informasi/ER.pptx
+++ b/Lectures/IF5030 Manajemen Informasi/ER.pptx
@@ -3402,1613 +3402,1634 @@
           <a:chExt cx="0" cy="0"/>
         </a:xfrm>
       </p:grpSpPr>
-      <p:sp>
-        <p:nvSpPr>
-          <p:cNvPr id="4" name="Diamond 3">
-            <a:extLst>
-              <a:ext uri="{FF2B5EF4-FFF2-40B4-BE49-F238E27FC236}">
-                <a16:creationId xmlns:a16="http://schemas.microsoft.com/office/drawing/2014/main" id="{128ACD66-3CB1-4ACA-B10A-529D0B7D8D95}"/>
-              </a:ext>
-            </a:extLst>
-          </p:cNvPr>
-          <p:cNvSpPr/>
+      <p:grpSp>
+        <p:nvGrpSpPr>
+          <p:cNvPr id="192" name="Group 191">
+            <a:extLst>
+              <a:ext uri="{FF2B5EF4-FFF2-40B4-BE49-F238E27FC236}">
+                <a16:creationId xmlns:a16="http://schemas.microsoft.com/office/drawing/2014/main" id="{80D4214C-503A-49F8-91C1-2183AFB171DF}"/>
+              </a:ext>
+            </a:extLst>
+          </p:cNvPr>
+          <p:cNvGrpSpPr/>
           <p:nvPr/>
-        </p:nvSpPr>
-        <p:spPr>
+        </p:nvGrpSpPr>
+        <p:grpSpPr>
           <a:xfrm>
-            <a:off x="4123386" y="257577"/>
-            <a:ext cx="1841679" cy="914400"/>
+            <a:off x="74907" y="257577"/>
+            <a:ext cx="11449598" cy="6253762"/>
+            <a:chOff x="74907" y="257577"/>
+            <a:chExt cx="11449598" cy="6253762"/>
           </a:xfrm>
-          <a:prstGeom prst="diamond">
-            <a:avLst/>
-          </a:prstGeom>
-        </p:spPr>
-        <p:style>
-          <a:lnRef idx="2">
-            <a:schemeClr val="accent6"/>
-          </a:lnRef>
-          <a:fillRef idx="1">
-            <a:schemeClr val="lt1"/>
-          </a:fillRef>
-          <a:effectRef idx="0">
-            <a:schemeClr val="accent6"/>
-          </a:effectRef>
-          <a:fontRef idx="minor">
-            <a:schemeClr val="dk1"/>
-          </a:fontRef>
-        </p:style>
-        <p:txBody>
-          <a:bodyPr rtlCol="0" anchor="ctr"/>
-          <a:lstStyle/>
-          <a:p>
-            <a:pPr algn="ctr"/>
-            <a:r>
-              <a:rPr lang="en-US" sz="1200" dirty="0" err="1"/>
-              <a:t>Jual</a:t>
-            </a:r>
-            <a:r>
-              <a:rPr lang="en-US" sz="1200" dirty="0"/>
-              <a:t> </a:t>
-            </a:r>
-            <a:r>
-              <a:rPr lang="en-US" sz="1200" dirty="0" err="1"/>
-              <a:t>Barang</a:t>
-            </a:r>
-            <a:endParaRPr lang="en-US" sz="1200" dirty="0"/>
-          </a:p>
-        </p:txBody>
-      </p:sp>
-      <p:sp>
-        <p:nvSpPr>
-          <p:cNvPr id="6" name="Diamond 5">
-            <a:extLst>
-              <a:ext uri="{FF2B5EF4-FFF2-40B4-BE49-F238E27FC236}">
-                <a16:creationId xmlns:a16="http://schemas.microsoft.com/office/drawing/2014/main" id="{E8765C0D-1ED5-495F-9012-2F25F6B7AB1A}"/>
-              </a:ext>
-            </a:extLst>
-          </p:cNvPr>
-          <p:cNvSpPr/>
-          <p:nvPr/>
-        </p:nvSpPr>
-        <p:spPr>
-          <a:xfrm>
-            <a:off x="4123385" y="1629177"/>
-            <a:ext cx="1841679" cy="914400"/>
-          </a:xfrm>
-          <a:prstGeom prst="diamond">
-            <a:avLst/>
-          </a:prstGeom>
-        </p:spPr>
-        <p:style>
-          <a:lnRef idx="2">
-            <a:schemeClr val="accent6"/>
-          </a:lnRef>
-          <a:fillRef idx="1">
-            <a:schemeClr val="lt1"/>
-          </a:fillRef>
-          <a:effectRef idx="0">
-            <a:schemeClr val="accent6"/>
-          </a:effectRef>
-          <a:fontRef idx="minor">
-            <a:schemeClr val="dk1"/>
-          </a:fontRef>
-        </p:style>
-        <p:txBody>
-          <a:bodyPr rtlCol="0" anchor="ctr"/>
-          <a:lstStyle/>
-          <a:p>
-            <a:pPr algn="ctr"/>
-            <a:r>
-              <a:rPr lang="en-US" sz="1200" dirty="0" err="1"/>
-              <a:t>Beli</a:t>
-            </a:r>
-            <a:r>
-              <a:rPr lang="en-US" sz="1200" dirty="0"/>
-              <a:t> </a:t>
-            </a:r>
-            <a:r>
-              <a:rPr lang="en-US" sz="1200" dirty="0" err="1"/>
-              <a:t>Barang</a:t>
-            </a:r>
-            <a:endParaRPr lang="en-US" sz="1200" dirty="0"/>
-          </a:p>
-        </p:txBody>
-      </p:sp>
-      <p:sp>
-        <p:nvSpPr>
-          <p:cNvPr id="8" name="Diamond 7">
-            <a:extLst>
-              <a:ext uri="{FF2B5EF4-FFF2-40B4-BE49-F238E27FC236}">
-                <a16:creationId xmlns:a16="http://schemas.microsoft.com/office/drawing/2014/main" id="{958A0FB2-4B5E-47A8-BD15-A84027BDE666}"/>
-              </a:ext>
-            </a:extLst>
-          </p:cNvPr>
-          <p:cNvSpPr/>
-          <p:nvPr/>
-        </p:nvSpPr>
-        <p:spPr>
-          <a:xfrm>
-            <a:off x="74907" y="2753394"/>
-            <a:ext cx="1841679" cy="914400"/>
-          </a:xfrm>
-          <a:prstGeom prst="diamond">
-            <a:avLst/>
-          </a:prstGeom>
-        </p:spPr>
-        <p:style>
-          <a:lnRef idx="2">
-            <a:schemeClr val="accent6"/>
-          </a:lnRef>
-          <a:fillRef idx="1">
-            <a:schemeClr val="lt1"/>
-          </a:fillRef>
-          <a:effectRef idx="0">
-            <a:schemeClr val="accent6"/>
-          </a:effectRef>
-          <a:fontRef idx="minor">
-            <a:schemeClr val="dk1"/>
-          </a:fontRef>
-        </p:style>
-        <p:txBody>
-          <a:bodyPr rtlCol="0" anchor="ctr"/>
-          <a:lstStyle/>
-          <a:p>
-            <a:pPr algn="ctr"/>
-            <a:r>
-              <a:rPr lang="en-US" sz="1200" dirty="0" err="1"/>
-              <a:t>Barang</a:t>
-            </a:r>
-            <a:r>
-              <a:rPr lang="en-US" sz="1200" dirty="0"/>
-              <a:t> </a:t>
-            </a:r>
-            <a:r>
-              <a:rPr lang="en-US" sz="1200" dirty="0" err="1"/>
-              <a:t>Masuk</a:t>
-            </a:r>
-            <a:endParaRPr lang="en-US" sz="1200" dirty="0"/>
-          </a:p>
-        </p:txBody>
-      </p:sp>
-      <p:sp>
-        <p:nvSpPr>
-          <p:cNvPr id="10" name="Diamond 9">
-            <a:extLst>
-              <a:ext uri="{FF2B5EF4-FFF2-40B4-BE49-F238E27FC236}">
-                <a16:creationId xmlns:a16="http://schemas.microsoft.com/office/drawing/2014/main" id="{D6473FE3-E4F5-4833-BBE0-2794F94C4C16}"/>
-              </a:ext>
-            </a:extLst>
-          </p:cNvPr>
-          <p:cNvSpPr/>
-          <p:nvPr/>
-        </p:nvSpPr>
-        <p:spPr>
-          <a:xfrm>
-            <a:off x="2281706" y="2319430"/>
-            <a:ext cx="1841679" cy="914400"/>
-          </a:xfrm>
-          <a:prstGeom prst="diamond">
-            <a:avLst/>
-          </a:prstGeom>
-        </p:spPr>
-        <p:style>
-          <a:lnRef idx="2">
-            <a:schemeClr val="accent6"/>
-          </a:lnRef>
-          <a:fillRef idx="1">
-            <a:schemeClr val="lt1"/>
-          </a:fillRef>
-          <a:effectRef idx="0">
-            <a:schemeClr val="accent6"/>
-          </a:effectRef>
-          <a:fontRef idx="minor">
-            <a:schemeClr val="dk1"/>
-          </a:fontRef>
-        </p:style>
-        <p:txBody>
-          <a:bodyPr rtlCol="0" anchor="ctr"/>
-          <a:lstStyle/>
-          <a:p>
-            <a:pPr algn="ctr"/>
-            <a:r>
-              <a:rPr lang="en-US" sz="1200" dirty="0" err="1"/>
-              <a:t>Barang</a:t>
-            </a:r>
-            <a:r>
-              <a:rPr lang="en-US" sz="1200" dirty="0"/>
-              <a:t> </a:t>
-            </a:r>
-            <a:r>
-              <a:rPr lang="en-US" sz="1200" dirty="0" err="1"/>
-              <a:t>Keluar</a:t>
-            </a:r>
-            <a:endParaRPr lang="en-US" sz="1200" dirty="0"/>
-          </a:p>
-        </p:txBody>
-      </p:sp>
-      <p:sp>
-        <p:nvSpPr>
-          <p:cNvPr id="11" name="Rectangle 10">
-            <a:extLst>
-              <a:ext uri="{FF2B5EF4-FFF2-40B4-BE49-F238E27FC236}">
-                <a16:creationId xmlns:a16="http://schemas.microsoft.com/office/drawing/2014/main" id="{A1AE0B0D-791A-44FC-9FFE-21A913FDE358}"/>
-              </a:ext>
-            </a:extLst>
-          </p:cNvPr>
-          <p:cNvSpPr/>
-          <p:nvPr/>
-        </p:nvSpPr>
-        <p:spPr>
-          <a:xfrm>
-            <a:off x="991456" y="1171977"/>
-            <a:ext cx="2215382" cy="463640"/>
-          </a:xfrm>
-          <a:prstGeom prst="rect">
-            <a:avLst/>
-          </a:prstGeom>
-        </p:spPr>
-        <p:style>
-          <a:lnRef idx="2">
-            <a:schemeClr val="accent6"/>
-          </a:lnRef>
-          <a:fillRef idx="1">
-            <a:schemeClr val="lt1"/>
-          </a:fillRef>
-          <a:effectRef idx="0">
-            <a:schemeClr val="accent6"/>
-          </a:effectRef>
-          <a:fontRef idx="minor">
-            <a:schemeClr val="dk1"/>
-          </a:fontRef>
-        </p:style>
-        <p:txBody>
-          <a:bodyPr rtlCol="0" anchor="ctr"/>
-          <a:lstStyle/>
-          <a:p>
-            <a:pPr algn="ctr"/>
-            <a:r>
-              <a:rPr lang="en-US" sz="1200" dirty="0" err="1"/>
-              <a:t>Produk</a:t>
-            </a:r>
-            <a:endParaRPr lang="en-US" sz="1200" dirty="0"/>
-          </a:p>
-        </p:txBody>
-      </p:sp>
-      <p:sp>
-        <p:nvSpPr>
-          <p:cNvPr id="13" name="Rectangle 12">
-            <a:extLst>
-              <a:ext uri="{FF2B5EF4-FFF2-40B4-BE49-F238E27FC236}">
-                <a16:creationId xmlns:a16="http://schemas.microsoft.com/office/drawing/2014/main" id="{2AFEA10D-68F9-4DD3-B20F-FAFE8816B0B3}"/>
-              </a:ext>
-            </a:extLst>
-          </p:cNvPr>
-          <p:cNvSpPr/>
-          <p:nvPr/>
-        </p:nvSpPr>
-        <p:spPr>
-          <a:xfrm>
-            <a:off x="8014524" y="1171977"/>
-            <a:ext cx="2215382" cy="463640"/>
-          </a:xfrm>
-          <a:prstGeom prst="rect">
-            <a:avLst/>
-          </a:prstGeom>
-        </p:spPr>
-        <p:style>
-          <a:lnRef idx="2">
-            <a:schemeClr val="accent6"/>
-          </a:lnRef>
-          <a:fillRef idx="1">
-            <a:schemeClr val="lt1"/>
-          </a:fillRef>
-          <a:effectRef idx="0">
-            <a:schemeClr val="accent6"/>
-          </a:effectRef>
-          <a:fontRef idx="minor">
-            <a:schemeClr val="dk1"/>
-          </a:fontRef>
-        </p:style>
-        <p:txBody>
-          <a:bodyPr rtlCol="0" anchor="ctr"/>
-          <a:lstStyle/>
-          <a:p>
-            <a:pPr algn="ctr"/>
-            <a:r>
-              <a:rPr lang="en-US" sz="1200" dirty="0"/>
-              <a:t>Mitra</a:t>
-            </a:r>
-          </a:p>
-        </p:txBody>
-      </p:sp>
-      <p:sp>
-        <p:nvSpPr>
-          <p:cNvPr id="15" name="Rectangle 14">
-            <a:extLst>
-              <a:ext uri="{FF2B5EF4-FFF2-40B4-BE49-F238E27FC236}">
-                <a16:creationId xmlns:a16="http://schemas.microsoft.com/office/drawing/2014/main" id="{F9A57C6B-22E1-498E-9B16-185770D1357D}"/>
-              </a:ext>
-            </a:extLst>
-          </p:cNvPr>
-          <p:cNvSpPr/>
-          <p:nvPr/>
-        </p:nvSpPr>
-        <p:spPr>
-          <a:xfrm>
-            <a:off x="991456" y="4837522"/>
-            <a:ext cx="2215382" cy="463640"/>
-          </a:xfrm>
-          <a:prstGeom prst="rect">
-            <a:avLst/>
-          </a:prstGeom>
-        </p:spPr>
-        <p:style>
-          <a:lnRef idx="2">
-            <a:schemeClr val="accent6"/>
-          </a:lnRef>
-          <a:fillRef idx="1">
-            <a:schemeClr val="lt1"/>
-          </a:fillRef>
-          <a:effectRef idx="0">
-            <a:schemeClr val="accent6"/>
-          </a:effectRef>
-          <a:fontRef idx="minor">
-            <a:schemeClr val="dk1"/>
-          </a:fontRef>
-        </p:style>
-        <p:txBody>
-          <a:bodyPr rtlCol="0" anchor="ctr"/>
-          <a:lstStyle/>
-          <a:p>
-            <a:pPr algn="ctr"/>
-            <a:r>
-              <a:rPr lang="en-US" sz="1200" dirty="0"/>
-              <a:t>Gudang</a:t>
-            </a:r>
-          </a:p>
-        </p:txBody>
-      </p:sp>
-      <p:sp>
-        <p:nvSpPr>
-          <p:cNvPr id="17" name="Rectangle 16">
-            <a:extLst>
-              <a:ext uri="{FF2B5EF4-FFF2-40B4-BE49-F238E27FC236}">
-                <a16:creationId xmlns:a16="http://schemas.microsoft.com/office/drawing/2014/main" id="{34462B06-036E-4FA2-8A53-E1851DAD4FFB}"/>
-              </a:ext>
-            </a:extLst>
-          </p:cNvPr>
-          <p:cNvSpPr/>
-          <p:nvPr/>
-        </p:nvSpPr>
-        <p:spPr>
-          <a:xfrm>
-            <a:off x="6906833" y="4836554"/>
-            <a:ext cx="2215382" cy="463640"/>
-          </a:xfrm>
-          <a:prstGeom prst="rect">
-            <a:avLst/>
-          </a:prstGeom>
-        </p:spPr>
-        <p:style>
-          <a:lnRef idx="2">
-            <a:schemeClr val="accent6"/>
-          </a:lnRef>
-          <a:fillRef idx="1">
-            <a:schemeClr val="lt1"/>
-          </a:fillRef>
-          <a:effectRef idx="0">
-            <a:schemeClr val="accent6"/>
-          </a:effectRef>
-          <a:fontRef idx="minor">
-            <a:schemeClr val="dk1"/>
-          </a:fontRef>
-        </p:style>
-        <p:txBody>
-          <a:bodyPr rtlCol="0" anchor="ctr"/>
-          <a:lstStyle/>
-          <a:p>
-            <a:pPr algn="ctr"/>
-            <a:r>
-              <a:rPr lang="en-US" sz="1200" dirty="0" err="1"/>
-              <a:t>Pegawai</a:t>
-            </a:r>
-            <a:endParaRPr lang="en-US" sz="1200" dirty="0"/>
-          </a:p>
-        </p:txBody>
-      </p:sp>
-      <p:sp>
-        <p:nvSpPr>
-          <p:cNvPr id="19" name="Rectangle 18">
-            <a:extLst>
-              <a:ext uri="{FF2B5EF4-FFF2-40B4-BE49-F238E27FC236}">
-                <a16:creationId xmlns:a16="http://schemas.microsoft.com/office/drawing/2014/main" id="{B1A6F8BB-3D94-4022-88BF-A314C941C098}"/>
-              </a:ext>
-            </a:extLst>
-          </p:cNvPr>
-          <p:cNvSpPr/>
-          <p:nvPr/>
-        </p:nvSpPr>
-        <p:spPr>
-          <a:xfrm>
-            <a:off x="9309123" y="4810796"/>
-            <a:ext cx="2215382" cy="463640"/>
-          </a:xfrm>
-          <a:prstGeom prst="rect">
-            <a:avLst/>
-          </a:prstGeom>
-        </p:spPr>
-        <p:style>
-          <a:lnRef idx="2">
-            <a:schemeClr val="accent6"/>
-          </a:lnRef>
-          <a:fillRef idx="1">
-            <a:schemeClr val="lt1"/>
-          </a:fillRef>
-          <a:effectRef idx="0">
-            <a:schemeClr val="accent6"/>
-          </a:effectRef>
-          <a:fontRef idx="minor">
-            <a:schemeClr val="dk1"/>
-          </a:fontRef>
-        </p:style>
-        <p:txBody>
-          <a:bodyPr rtlCol="0" anchor="ctr"/>
-          <a:lstStyle/>
-          <a:p>
-            <a:pPr algn="ctr"/>
-            <a:r>
-              <a:rPr lang="en-US" sz="1200" dirty="0" err="1"/>
-              <a:t>Aset</a:t>
-            </a:r>
-            <a:endParaRPr lang="en-US" sz="1200" dirty="0"/>
-          </a:p>
-        </p:txBody>
-      </p:sp>
-      <p:sp>
-        <p:nvSpPr>
-          <p:cNvPr id="21" name="Rectangle 20">
-            <a:extLst>
-              <a:ext uri="{FF2B5EF4-FFF2-40B4-BE49-F238E27FC236}">
-                <a16:creationId xmlns:a16="http://schemas.microsoft.com/office/drawing/2014/main" id="{F8C3CE20-53AC-4E44-B5DF-149FA4F348ED}"/>
-              </a:ext>
-            </a:extLst>
-          </p:cNvPr>
-          <p:cNvSpPr/>
-          <p:nvPr/>
-        </p:nvSpPr>
-        <p:spPr>
-          <a:xfrm>
-            <a:off x="9215586" y="5815612"/>
-            <a:ext cx="2215382" cy="463640"/>
-          </a:xfrm>
-          <a:prstGeom prst="rect">
-            <a:avLst/>
-          </a:prstGeom>
-        </p:spPr>
-        <p:style>
-          <a:lnRef idx="2">
-            <a:schemeClr val="accent6"/>
-          </a:lnRef>
-          <a:fillRef idx="1">
-            <a:schemeClr val="lt1"/>
-          </a:fillRef>
-          <a:effectRef idx="0">
-            <a:schemeClr val="accent6"/>
-          </a:effectRef>
-          <a:fontRef idx="minor">
-            <a:schemeClr val="dk1"/>
-          </a:fontRef>
-        </p:style>
-        <p:txBody>
-          <a:bodyPr rtlCol="0" anchor="ctr"/>
-          <a:lstStyle/>
-          <a:p>
-            <a:pPr algn="ctr"/>
-            <a:r>
-              <a:rPr lang="en-US" sz="1200" dirty="0" err="1"/>
-              <a:t>Kendaraan</a:t>
-            </a:r>
-            <a:endParaRPr lang="en-US" sz="1200" dirty="0"/>
-          </a:p>
-        </p:txBody>
-      </p:sp>
-      <p:sp>
-        <p:nvSpPr>
-          <p:cNvPr id="23" name="Diamond 22">
-            <a:extLst>
-              <a:ext uri="{FF2B5EF4-FFF2-40B4-BE49-F238E27FC236}">
-                <a16:creationId xmlns:a16="http://schemas.microsoft.com/office/drawing/2014/main" id="{4CB4C4D4-12BB-4E22-8B58-BBDA806C3518}"/>
-              </a:ext>
-            </a:extLst>
-          </p:cNvPr>
-          <p:cNvSpPr/>
-          <p:nvPr/>
-        </p:nvSpPr>
-        <p:spPr>
-          <a:xfrm>
-            <a:off x="4129183" y="4600224"/>
-            <a:ext cx="1841679" cy="914400"/>
-          </a:xfrm>
-          <a:prstGeom prst="diamond">
-            <a:avLst/>
-          </a:prstGeom>
-        </p:spPr>
-        <p:style>
-          <a:lnRef idx="2">
-            <a:schemeClr val="accent6"/>
-          </a:lnRef>
-          <a:fillRef idx="1">
-            <a:schemeClr val="lt1"/>
-          </a:fillRef>
-          <a:effectRef idx="0">
-            <a:schemeClr val="accent6"/>
-          </a:effectRef>
-          <a:fontRef idx="minor">
-            <a:schemeClr val="dk1"/>
-          </a:fontRef>
-        </p:style>
-        <p:txBody>
-          <a:bodyPr rtlCol="0" anchor="ctr"/>
-          <a:lstStyle/>
-          <a:p>
-            <a:pPr algn="ctr"/>
-            <a:r>
-              <a:rPr lang="en-US" sz="1200" dirty="0" err="1"/>
-              <a:t>Penjaga</a:t>
-            </a:r>
-            <a:r>
-              <a:rPr lang="en-US" sz="1200" dirty="0"/>
-              <a:t> Gudang</a:t>
-            </a:r>
-          </a:p>
-        </p:txBody>
-      </p:sp>
-      <p:sp>
-        <p:nvSpPr>
-          <p:cNvPr id="25" name="Diamond 24">
-            <a:extLst>
-              <a:ext uri="{FF2B5EF4-FFF2-40B4-BE49-F238E27FC236}">
-                <a16:creationId xmlns:a16="http://schemas.microsoft.com/office/drawing/2014/main" id="{088A7E3D-0276-47CC-BEFB-233B3DDF6FE0}"/>
-              </a:ext>
-            </a:extLst>
-          </p:cNvPr>
-          <p:cNvSpPr/>
-          <p:nvPr/>
-        </p:nvSpPr>
-        <p:spPr>
-          <a:xfrm>
-            <a:off x="7093684" y="2318464"/>
-            <a:ext cx="1841679" cy="914400"/>
-          </a:xfrm>
-          <a:prstGeom prst="diamond">
-            <a:avLst/>
-          </a:prstGeom>
-        </p:spPr>
-        <p:style>
-          <a:lnRef idx="2">
-            <a:schemeClr val="accent6"/>
-          </a:lnRef>
-          <a:fillRef idx="1">
-            <a:schemeClr val="lt1"/>
-          </a:fillRef>
-          <a:effectRef idx="0">
-            <a:schemeClr val="accent6"/>
-          </a:effectRef>
-          <a:fontRef idx="minor">
-            <a:schemeClr val="dk1"/>
-          </a:fontRef>
-        </p:style>
-        <p:txBody>
-          <a:bodyPr rtlCol="0" anchor="ctr"/>
-          <a:lstStyle/>
-          <a:p>
-            <a:pPr algn="ctr"/>
-            <a:r>
-              <a:rPr lang="en-US" sz="1200" dirty="0" err="1"/>
-              <a:t>Beli</a:t>
-            </a:r>
-            <a:r>
-              <a:rPr lang="en-US" sz="1200" dirty="0"/>
-              <a:t> </a:t>
-            </a:r>
-            <a:r>
-              <a:rPr lang="en-US" sz="1200" dirty="0" err="1"/>
-              <a:t>Aset</a:t>
-            </a:r>
-            <a:endParaRPr lang="en-US" sz="1200" dirty="0"/>
-          </a:p>
-        </p:txBody>
-      </p:sp>
-      <p:sp>
-        <p:nvSpPr>
-          <p:cNvPr id="27" name="Diamond 26">
-            <a:extLst>
-              <a:ext uri="{FF2B5EF4-FFF2-40B4-BE49-F238E27FC236}">
-                <a16:creationId xmlns:a16="http://schemas.microsoft.com/office/drawing/2014/main" id="{72C7691E-702C-4A18-AA1B-49256D302BC0}"/>
-              </a:ext>
-            </a:extLst>
-          </p:cNvPr>
-          <p:cNvSpPr/>
-          <p:nvPr/>
-        </p:nvSpPr>
-        <p:spPr>
-          <a:xfrm>
-            <a:off x="9495809" y="2324904"/>
-            <a:ext cx="1841679" cy="914400"/>
-          </a:xfrm>
-          <a:prstGeom prst="diamond">
-            <a:avLst/>
-          </a:prstGeom>
-        </p:spPr>
-        <p:style>
-          <a:lnRef idx="2">
-            <a:schemeClr val="accent6"/>
-          </a:lnRef>
-          <a:fillRef idx="1">
-            <a:schemeClr val="lt1"/>
-          </a:fillRef>
-          <a:effectRef idx="0">
-            <a:schemeClr val="accent6"/>
-          </a:effectRef>
-          <a:fontRef idx="minor">
-            <a:schemeClr val="dk1"/>
-          </a:fontRef>
-        </p:style>
-        <p:txBody>
-          <a:bodyPr rtlCol="0" anchor="ctr"/>
-          <a:lstStyle/>
-          <a:p>
-            <a:pPr algn="ctr"/>
-            <a:r>
-              <a:rPr lang="en-US" sz="1200" dirty="0" err="1"/>
-              <a:t>Jual</a:t>
-            </a:r>
-            <a:r>
-              <a:rPr lang="en-US" sz="1200" dirty="0"/>
-              <a:t> </a:t>
-            </a:r>
-            <a:r>
-              <a:rPr lang="en-US" sz="1200" dirty="0" err="1"/>
-              <a:t>Aset</a:t>
-            </a:r>
-            <a:endParaRPr lang="en-US" sz="1200" dirty="0"/>
-          </a:p>
-        </p:txBody>
-      </p:sp>
-      <p:cxnSp>
-        <p:nvCxnSpPr>
-          <p:cNvPr id="29" name="Straight Connector 28">
-            <a:extLst>
-              <a:ext uri="{FF2B5EF4-FFF2-40B4-BE49-F238E27FC236}">
-                <a16:creationId xmlns:a16="http://schemas.microsoft.com/office/drawing/2014/main" id="{14421C86-54EB-4F5E-B430-D9AC1D7B9FED}"/>
-              </a:ext>
-            </a:extLst>
-          </p:cNvPr>
-          <p:cNvCxnSpPr>
-            <a:stCxn id="8" idx="0"/>
-            <a:endCxn id="11" idx="2"/>
-          </p:cNvCxnSpPr>
-          <p:nvPr/>
-        </p:nvCxnSpPr>
-        <p:spPr>
-          <a:xfrm flipV="1">
-            <a:off x="995747" y="1635617"/>
-            <a:ext cx="1103400" cy="1117777"/>
-          </a:xfrm>
-          <a:prstGeom prst="line">
-            <a:avLst/>
-          </a:prstGeom>
-        </p:spPr>
-        <p:style>
-          <a:lnRef idx="1">
-            <a:schemeClr val="accent1"/>
-          </a:lnRef>
-          <a:fillRef idx="0">
-            <a:schemeClr val="accent1"/>
-          </a:fillRef>
-          <a:effectRef idx="0">
-            <a:schemeClr val="accent1"/>
-          </a:effectRef>
-          <a:fontRef idx="minor">
-            <a:schemeClr val="tx1"/>
-          </a:fontRef>
-        </p:style>
-      </p:cxnSp>
-      <p:cxnSp>
-        <p:nvCxnSpPr>
-          <p:cNvPr id="30" name="Straight Connector 29">
-            <a:extLst>
-              <a:ext uri="{FF2B5EF4-FFF2-40B4-BE49-F238E27FC236}">
-                <a16:creationId xmlns:a16="http://schemas.microsoft.com/office/drawing/2014/main" id="{91457382-164E-4B41-A3B3-7FFFEDA6C387}"/>
-              </a:ext>
-            </a:extLst>
-          </p:cNvPr>
-          <p:cNvCxnSpPr>
-            <a:cxnSpLocks/>
-            <a:stCxn id="10" idx="0"/>
-            <a:endCxn id="11" idx="2"/>
-          </p:cNvCxnSpPr>
-          <p:nvPr/>
-        </p:nvCxnSpPr>
-        <p:spPr>
-          <a:xfrm flipH="1" flipV="1">
-            <a:off x="2099147" y="1635617"/>
-            <a:ext cx="1103399" cy="683813"/>
-          </a:xfrm>
-          <a:prstGeom prst="line">
-            <a:avLst/>
-          </a:prstGeom>
-        </p:spPr>
-        <p:style>
-          <a:lnRef idx="1">
-            <a:schemeClr val="accent1"/>
-          </a:lnRef>
-          <a:fillRef idx="0">
-            <a:schemeClr val="accent1"/>
-          </a:fillRef>
-          <a:effectRef idx="0">
-            <a:schemeClr val="accent1"/>
-          </a:effectRef>
-          <a:fontRef idx="minor">
-            <a:schemeClr val="tx1"/>
-          </a:fontRef>
-        </p:style>
-      </p:cxnSp>
-      <p:cxnSp>
-        <p:nvCxnSpPr>
-          <p:cNvPr id="33" name="Straight Connector 32">
-            <a:extLst>
-              <a:ext uri="{FF2B5EF4-FFF2-40B4-BE49-F238E27FC236}">
-                <a16:creationId xmlns:a16="http://schemas.microsoft.com/office/drawing/2014/main" id="{FCBF5A17-A250-4D1B-AF8B-CEA0BFE44B18}"/>
-              </a:ext>
-            </a:extLst>
-          </p:cNvPr>
-          <p:cNvCxnSpPr>
-            <a:cxnSpLocks/>
-            <a:stCxn id="15" idx="0"/>
-            <a:endCxn id="10" idx="2"/>
-          </p:cNvCxnSpPr>
-          <p:nvPr/>
-        </p:nvCxnSpPr>
-        <p:spPr>
-          <a:xfrm flipV="1">
-            <a:off x="2099147" y="3233830"/>
-            <a:ext cx="1103399" cy="1603692"/>
-          </a:xfrm>
-          <a:prstGeom prst="line">
-            <a:avLst/>
-          </a:prstGeom>
-        </p:spPr>
-        <p:style>
-          <a:lnRef idx="1">
-            <a:schemeClr val="accent1"/>
-          </a:lnRef>
-          <a:fillRef idx="0">
-            <a:schemeClr val="accent1"/>
-          </a:fillRef>
-          <a:effectRef idx="0">
-            <a:schemeClr val="accent1"/>
-          </a:effectRef>
-          <a:fontRef idx="minor">
-            <a:schemeClr val="tx1"/>
-          </a:fontRef>
-        </p:style>
-      </p:cxnSp>
-      <p:cxnSp>
-        <p:nvCxnSpPr>
-          <p:cNvPr id="36" name="Straight Connector 35">
-            <a:extLst>
-              <a:ext uri="{FF2B5EF4-FFF2-40B4-BE49-F238E27FC236}">
-                <a16:creationId xmlns:a16="http://schemas.microsoft.com/office/drawing/2014/main" id="{911FE92B-A204-4D52-905C-0A7B3B4643BC}"/>
-              </a:ext>
-            </a:extLst>
-          </p:cNvPr>
-          <p:cNvCxnSpPr>
-            <a:cxnSpLocks/>
-            <a:stCxn id="8" idx="2"/>
-            <a:endCxn id="15" idx="0"/>
-          </p:cNvCxnSpPr>
-          <p:nvPr/>
-        </p:nvCxnSpPr>
-        <p:spPr>
-          <a:xfrm>
-            <a:off x="995747" y="3667794"/>
-            <a:ext cx="1103400" cy="1169728"/>
-          </a:xfrm>
-          <a:prstGeom prst="line">
-            <a:avLst/>
-          </a:prstGeom>
-        </p:spPr>
-        <p:style>
-          <a:lnRef idx="1">
-            <a:schemeClr val="accent1"/>
-          </a:lnRef>
-          <a:fillRef idx="0">
-            <a:schemeClr val="accent1"/>
-          </a:fillRef>
-          <a:effectRef idx="0">
-            <a:schemeClr val="accent1"/>
-          </a:effectRef>
-          <a:fontRef idx="minor">
-            <a:schemeClr val="tx1"/>
-          </a:fontRef>
-        </p:style>
-      </p:cxnSp>
-      <p:cxnSp>
-        <p:nvCxnSpPr>
-          <p:cNvPr id="39" name="Straight Connector 38">
-            <a:extLst>
-              <a:ext uri="{FF2B5EF4-FFF2-40B4-BE49-F238E27FC236}">
-                <a16:creationId xmlns:a16="http://schemas.microsoft.com/office/drawing/2014/main" id="{D93998A6-953D-4171-AF78-6A830D177025}"/>
-              </a:ext>
-            </a:extLst>
-          </p:cNvPr>
-          <p:cNvCxnSpPr>
-            <a:cxnSpLocks/>
-            <a:stCxn id="11" idx="3"/>
-            <a:endCxn id="4" idx="1"/>
-          </p:cNvCxnSpPr>
-          <p:nvPr/>
-        </p:nvCxnSpPr>
-        <p:spPr>
-          <a:xfrm flipV="1">
-            <a:off x="3206838" y="714777"/>
-            <a:ext cx="916548" cy="689020"/>
-          </a:xfrm>
-          <a:prstGeom prst="line">
-            <a:avLst/>
-          </a:prstGeom>
-        </p:spPr>
-        <p:style>
-          <a:lnRef idx="1">
-            <a:schemeClr val="accent1"/>
-          </a:lnRef>
-          <a:fillRef idx="0">
-            <a:schemeClr val="accent1"/>
-          </a:fillRef>
-          <a:effectRef idx="0">
-            <a:schemeClr val="accent1"/>
-          </a:effectRef>
-          <a:fontRef idx="minor">
-            <a:schemeClr val="tx1"/>
-          </a:fontRef>
-        </p:style>
-      </p:cxnSp>
-      <p:cxnSp>
-        <p:nvCxnSpPr>
-          <p:cNvPr id="43" name="Straight Connector 42">
-            <a:extLst>
-              <a:ext uri="{FF2B5EF4-FFF2-40B4-BE49-F238E27FC236}">
-                <a16:creationId xmlns:a16="http://schemas.microsoft.com/office/drawing/2014/main" id="{98DF6F1F-FAE6-494C-8C20-764A1CE450EE}"/>
-              </a:ext>
-            </a:extLst>
-          </p:cNvPr>
-          <p:cNvCxnSpPr>
-            <a:cxnSpLocks/>
-            <a:stCxn id="11" idx="3"/>
-            <a:endCxn id="6" idx="1"/>
-          </p:cNvCxnSpPr>
-          <p:nvPr/>
-        </p:nvCxnSpPr>
-        <p:spPr>
-          <a:xfrm>
-            <a:off x="3206838" y="1403797"/>
-            <a:ext cx="916547" cy="682580"/>
-          </a:xfrm>
-          <a:prstGeom prst="line">
-            <a:avLst/>
-          </a:prstGeom>
-        </p:spPr>
-        <p:style>
-          <a:lnRef idx="1">
-            <a:schemeClr val="accent1"/>
-          </a:lnRef>
-          <a:fillRef idx="0">
-            <a:schemeClr val="accent1"/>
-          </a:fillRef>
-          <a:effectRef idx="0">
-            <a:schemeClr val="accent1"/>
-          </a:effectRef>
-          <a:fontRef idx="minor">
-            <a:schemeClr val="tx1"/>
-          </a:fontRef>
-        </p:style>
-      </p:cxnSp>
-      <p:cxnSp>
-        <p:nvCxnSpPr>
-          <p:cNvPr id="46" name="Straight Connector 45">
-            <a:extLst>
-              <a:ext uri="{FF2B5EF4-FFF2-40B4-BE49-F238E27FC236}">
-                <a16:creationId xmlns:a16="http://schemas.microsoft.com/office/drawing/2014/main" id="{E14D408A-2C28-4034-9E7B-273065CF043D}"/>
-              </a:ext>
-            </a:extLst>
-          </p:cNvPr>
-          <p:cNvCxnSpPr>
-            <a:cxnSpLocks/>
-            <a:stCxn id="13" idx="1"/>
-            <a:endCxn id="4" idx="3"/>
-          </p:cNvCxnSpPr>
-          <p:nvPr/>
-        </p:nvCxnSpPr>
-        <p:spPr>
-          <a:xfrm flipH="1" flipV="1">
-            <a:off x="5965065" y="714777"/>
-            <a:ext cx="2049459" cy="689020"/>
-          </a:xfrm>
-          <a:prstGeom prst="line">
-            <a:avLst/>
-          </a:prstGeom>
-        </p:spPr>
-        <p:style>
-          <a:lnRef idx="1">
-            <a:schemeClr val="accent1"/>
-          </a:lnRef>
-          <a:fillRef idx="0">
-            <a:schemeClr val="accent1"/>
-          </a:fillRef>
-          <a:effectRef idx="0">
-            <a:schemeClr val="accent1"/>
-          </a:effectRef>
-          <a:fontRef idx="minor">
-            <a:schemeClr val="tx1"/>
-          </a:fontRef>
-        </p:style>
-      </p:cxnSp>
-      <p:cxnSp>
-        <p:nvCxnSpPr>
-          <p:cNvPr id="49" name="Straight Connector 48">
-            <a:extLst>
-              <a:ext uri="{FF2B5EF4-FFF2-40B4-BE49-F238E27FC236}">
-                <a16:creationId xmlns:a16="http://schemas.microsoft.com/office/drawing/2014/main" id="{27A72982-5146-41F0-B8BD-B8D453610A1F}"/>
-              </a:ext>
-            </a:extLst>
-          </p:cNvPr>
-          <p:cNvCxnSpPr>
-            <a:cxnSpLocks/>
-            <a:stCxn id="6" idx="3"/>
-            <a:endCxn id="13" idx="1"/>
-          </p:cNvCxnSpPr>
-          <p:nvPr/>
-        </p:nvCxnSpPr>
-        <p:spPr>
-          <a:xfrm flipV="1">
-            <a:off x="5965064" y="1403797"/>
-            <a:ext cx="2049460" cy="682580"/>
-          </a:xfrm>
-          <a:prstGeom prst="line">
-            <a:avLst/>
-          </a:prstGeom>
-        </p:spPr>
-        <p:style>
-          <a:lnRef idx="1">
-            <a:schemeClr val="accent1"/>
-          </a:lnRef>
-          <a:fillRef idx="0">
-            <a:schemeClr val="accent1"/>
-          </a:fillRef>
-          <a:effectRef idx="0">
-            <a:schemeClr val="accent1"/>
-          </a:effectRef>
-          <a:fontRef idx="minor">
-            <a:schemeClr val="tx1"/>
-          </a:fontRef>
-        </p:style>
-      </p:cxnSp>
-      <p:cxnSp>
-        <p:nvCxnSpPr>
-          <p:cNvPr id="52" name="Straight Connector 51">
-            <a:extLst>
-              <a:ext uri="{FF2B5EF4-FFF2-40B4-BE49-F238E27FC236}">
-                <a16:creationId xmlns:a16="http://schemas.microsoft.com/office/drawing/2014/main" id="{E23A9ED5-E77A-4DC4-B92B-AB29DE51A0B3}"/>
-              </a:ext>
-            </a:extLst>
-          </p:cNvPr>
-          <p:cNvCxnSpPr>
-            <a:cxnSpLocks/>
-            <a:stCxn id="25" idx="0"/>
-            <a:endCxn id="13" idx="2"/>
-          </p:cNvCxnSpPr>
-          <p:nvPr/>
-        </p:nvCxnSpPr>
-        <p:spPr>
-          <a:xfrm flipV="1">
-            <a:off x="8014524" y="1635617"/>
-            <a:ext cx="1107691" cy="682847"/>
-          </a:xfrm>
-          <a:prstGeom prst="line">
-            <a:avLst/>
-          </a:prstGeom>
-        </p:spPr>
-        <p:style>
-          <a:lnRef idx="1">
-            <a:schemeClr val="accent1"/>
-          </a:lnRef>
-          <a:fillRef idx="0">
-            <a:schemeClr val="accent1"/>
-          </a:fillRef>
-          <a:effectRef idx="0">
-            <a:schemeClr val="accent1"/>
-          </a:effectRef>
-          <a:fontRef idx="minor">
-            <a:schemeClr val="tx1"/>
-          </a:fontRef>
-        </p:style>
-      </p:cxnSp>
-      <p:cxnSp>
-        <p:nvCxnSpPr>
-          <p:cNvPr id="55" name="Straight Connector 54">
-            <a:extLst>
-              <a:ext uri="{FF2B5EF4-FFF2-40B4-BE49-F238E27FC236}">
-                <a16:creationId xmlns:a16="http://schemas.microsoft.com/office/drawing/2014/main" id="{8575E8DE-4917-4775-9398-DC5B768270D8}"/>
-              </a:ext>
-            </a:extLst>
-          </p:cNvPr>
-          <p:cNvCxnSpPr>
-            <a:cxnSpLocks/>
-            <a:stCxn id="27" idx="0"/>
-            <a:endCxn id="13" idx="2"/>
-          </p:cNvCxnSpPr>
-          <p:nvPr/>
-        </p:nvCxnSpPr>
-        <p:spPr>
-          <a:xfrm flipH="1" flipV="1">
-            <a:off x="9122215" y="1635617"/>
-            <a:ext cx="1294434" cy="689287"/>
-          </a:xfrm>
-          <a:prstGeom prst="line">
-            <a:avLst/>
-          </a:prstGeom>
-        </p:spPr>
-        <p:style>
-          <a:lnRef idx="1">
-            <a:schemeClr val="accent1"/>
-          </a:lnRef>
-          <a:fillRef idx="0">
-            <a:schemeClr val="accent1"/>
-          </a:fillRef>
-          <a:effectRef idx="0">
-            <a:schemeClr val="accent1"/>
-          </a:effectRef>
-          <a:fontRef idx="minor">
-            <a:schemeClr val="tx1"/>
-          </a:fontRef>
-        </p:style>
-      </p:cxnSp>
-      <p:cxnSp>
-        <p:nvCxnSpPr>
-          <p:cNvPr id="58" name="Straight Connector 57">
-            <a:extLst>
-              <a:ext uri="{FF2B5EF4-FFF2-40B4-BE49-F238E27FC236}">
-                <a16:creationId xmlns:a16="http://schemas.microsoft.com/office/drawing/2014/main" id="{BA31222F-0661-4126-A674-0E7BE295FA92}"/>
-              </a:ext>
-            </a:extLst>
-          </p:cNvPr>
-          <p:cNvCxnSpPr>
-            <a:cxnSpLocks/>
-            <a:stCxn id="17" idx="0"/>
-            <a:endCxn id="27" idx="2"/>
-          </p:cNvCxnSpPr>
-          <p:nvPr/>
-        </p:nvCxnSpPr>
-        <p:spPr>
-          <a:xfrm flipV="1">
-            <a:off x="8014524" y="3239304"/>
-            <a:ext cx="2402125" cy="1597250"/>
-          </a:xfrm>
-          <a:prstGeom prst="line">
-            <a:avLst/>
-          </a:prstGeom>
-        </p:spPr>
-        <p:style>
-          <a:lnRef idx="1">
-            <a:schemeClr val="accent1"/>
-          </a:lnRef>
-          <a:fillRef idx="0">
-            <a:schemeClr val="accent1"/>
-          </a:fillRef>
-          <a:effectRef idx="0">
-            <a:schemeClr val="accent1"/>
-          </a:effectRef>
-          <a:fontRef idx="minor">
-            <a:schemeClr val="tx1"/>
-          </a:fontRef>
-        </p:style>
-      </p:cxnSp>
-      <p:cxnSp>
-        <p:nvCxnSpPr>
-          <p:cNvPr id="61" name="Straight Connector 60">
-            <a:extLst>
-              <a:ext uri="{FF2B5EF4-FFF2-40B4-BE49-F238E27FC236}">
-                <a16:creationId xmlns:a16="http://schemas.microsoft.com/office/drawing/2014/main" id="{D60A3DAA-31CF-4035-90C0-80C30314D686}"/>
-              </a:ext>
-            </a:extLst>
-          </p:cNvPr>
-          <p:cNvCxnSpPr>
-            <a:cxnSpLocks/>
-            <a:stCxn id="17" idx="0"/>
-            <a:endCxn id="25" idx="2"/>
-          </p:cNvCxnSpPr>
-          <p:nvPr/>
-        </p:nvCxnSpPr>
-        <p:spPr>
-          <a:xfrm flipV="1">
-            <a:off x="8014524" y="3232864"/>
-            <a:ext cx="0" cy="1603690"/>
-          </a:xfrm>
-          <a:prstGeom prst="line">
-            <a:avLst/>
-          </a:prstGeom>
-        </p:spPr>
-        <p:style>
-          <a:lnRef idx="1">
-            <a:schemeClr val="accent1"/>
-          </a:lnRef>
-          <a:fillRef idx="0">
-            <a:schemeClr val="accent1"/>
-          </a:fillRef>
-          <a:effectRef idx="0">
-            <a:schemeClr val="accent1"/>
-          </a:effectRef>
-          <a:fontRef idx="minor">
-            <a:schemeClr val="tx1"/>
-          </a:fontRef>
-        </p:style>
-      </p:cxnSp>
-      <p:cxnSp>
-        <p:nvCxnSpPr>
-          <p:cNvPr id="64" name="Straight Connector 63">
-            <a:extLst>
-              <a:ext uri="{FF2B5EF4-FFF2-40B4-BE49-F238E27FC236}">
-                <a16:creationId xmlns:a16="http://schemas.microsoft.com/office/drawing/2014/main" id="{5863468D-3421-4D61-A264-C68E4C875E94}"/>
-              </a:ext>
-            </a:extLst>
-          </p:cNvPr>
-          <p:cNvCxnSpPr>
-            <a:cxnSpLocks/>
-            <a:stCxn id="19" idx="0"/>
-            <a:endCxn id="27" idx="2"/>
-          </p:cNvCxnSpPr>
-          <p:nvPr/>
-        </p:nvCxnSpPr>
-        <p:spPr>
-          <a:xfrm flipH="1" flipV="1">
-            <a:off x="10416649" y="3239304"/>
-            <a:ext cx="165" cy="1571492"/>
-          </a:xfrm>
-          <a:prstGeom prst="line">
-            <a:avLst/>
-          </a:prstGeom>
-        </p:spPr>
-        <p:style>
-          <a:lnRef idx="1">
-            <a:schemeClr val="accent1"/>
-          </a:lnRef>
-          <a:fillRef idx="0">
-            <a:schemeClr val="accent1"/>
-          </a:fillRef>
-          <a:effectRef idx="0">
-            <a:schemeClr val="accent1"/>
-          </a:effectRef>
-          <a:fontRef idx="minor">
-            <a:schemeClr val="tx1"/>
-          </a:fontRef>
-        </p:style>
-      </p:cxnSp>
-      <p:cxnSp>
-        <p:nvCxnSpPr>
-          <p:cNvPr id="67" name="Straight Connector 66">
-            <a:extLst>
-              <a:ext uri="{FF2B5EF4-FFF2-40B4-BE49-F238E27FC236}">
-                <a16:creationId xmlns:a16="http://schemas.microsoft.com/office/drawing/2014/main" id="{3CCAF64A-2923-4EA7-8371-65E392C1E9FB}"/>
-              </a:ext>
-            </a:extLst>
-          </p:cNvPr>
-          <p:cNvCxnSpPr>
-            <a:cxnSpLocks/>
-            <a:stCxn id="19" idx="0"/>
-            <a:endCxn id="25" idx="2"/>
-          </p:cNvCxnSpPr>
-          <p:nvPr/>
-        </p:nvCxnSpPr>
-        <p:spPr>
-          <a:xfrm flipH="1" flipV="1">
-            <a:off x="8014524" y="3232864"/>
-            <a:ext cx="2402290" cy="1577932"/>
-          </a:xfrm>
-          <a:prstGeom prst="line">
-            <a:avLst/>
-          </a:prstGeom>
-        </p:spPr>
-        <p:style>
-          <a:lnRef idx="1">
-            <a:schemeClr val="accent1"/>
-          </a:lnRef>
-          <a:fillRef idx="0">
-            <a:schemeClr val="accent1"/>
-          </a:fillRef>
-          <a:effectRef idx="0">
-            <a:schemeClr val="accent1"/>
-          </a:effectRef>
-          <a:fontRef idx="minor">
-            <a:schemeClr val="tx1"/>
-          </a:fontRef>
-        </p:style>
-      </p:cxnSp>
-      <p:cxnSp>
-        <p:nvCxnSpPr>
-          <p:cNvPr id="89" name="Straight Connector 88">
-            <a:extLst>
-              <a:ext uri="{FF2B5EF4-FFF2-40B4-BE49-F238E27FC236}">
-                <a16:creationId xmlns:a16="http://schemas.microsoft.com/office/drawing/2014/main" id="{7B18F31B-C292-4F31-8889-91B8DB97E0F4}"/>
-              </a:ext>
-            </a:extLst>
-          </p:cNvPr>
-          <p:cNvCxnSpPr>
-            <a:cxnSpLocks/>
-            <a:stCxn id="17" idx="2"/>
-            <a:endCxn id="97" idx="0"/>
-          </p:cNvCxnSpPr>
-          <p:nvPr/>
-        </p:nvCxnSpPr>
-        <p:spPr>
-          <a:xfrm>
-            <a:off x="8014524" y="5300194"/>
-            <a:ext cx="0" cy="296745"/>
-          </a:xfrm>
-          <a:prstGeom prst="line">
-            <a:avLst/>
-          </a:prstGeom>
-        </p:spPr>
-        <p:style>
-          <a:lnRef idx="1">
-            <a:schemeClr val="accent1"/>
-          </a:lnRef>
-          <a:fillRef idx="0">
-            <a:schemeClr val="accent1"/>
-          </a:fillRef>
-          <a:effectRef idx="0">
-            <a:schemeClr val="accent1"/>
-          </a:effectRef>
-          <a:fontRef idx="minor">
-            <a:schemeClr val="tx1"/>
-          </a:fontRef>
-        </p:style>
-      </p:cxnSp>
-      <p:cxnSp>
-        <p:nvCxnSpPr>
-          <p:cNvPr id="91" name="Straight Connector 90">
-            <a:extLst>
-              <a:ext uri="{FF2B5EF4-FFF2-40B4-BE49-F238E27FC236}">
-                <a16:creationId xmlns:a16="http://schemas.microsoft.com/office/drawing/2014/main" id="{019F4F04-D79E-4923-AD33-474BB0835C0B}"/>
-              </a:ext>
-            </a:extLst>
-          </p:cNvPr>
-          <p:cNvCxnSpPr>
-            <a:cxnSpLocks/>
-            <a:stCxn id="97" idx="3"/>
-            <a:endCxn id="21" idx="1"/>
-          </p:cNvCxnSpPr>
-          <p:nvPr/>
-        </p:nvCxnSpPr>
-        <p:spPr>
-          <a:xfrm flipV="1">
-            <a:off x="8935363" y="6047432"/>
-            <a:ext cx="280223" cy="6707"/>
-          </a:xfrm>
-          <a:prstGeom prst="line">
-            <a:avLst/>
-          </a:prstGeom>
-        </p:spPr>
-        <p:style>
-          <a:lnRef idx="1">
-            <a:schemeClr val="accent1"/>
-          </a:lnRef>
-          <a:fillRef idx="0">
-            <a:schemeClr val="accent1"/>
-          </a:fillRef>
-          <a:effectRef idx="0">
-            <a:schemeClr val="accent1"/>
-          </a:effectRef>
-          <a:fontRef idx="minor">
-            <a:schemeClr val="tx1"/>
-          </a:fontRef>
-        </p:style>
-      </p:cxnSp>
-      <p:sp>
-        <p:nvSpPr>
-          <p:cNvPr id="97" name="Diamond 96">
-            <a:extLst>
-              <a:ext uri="{FF2B5EF4-FFF2-40B4-BE49-F238E27FC236}">
-                <a16:creationId xmlns:a16="http://schemas.microsoft.com/office/drawing/2014/main" id="{FA131C8C-7A63-4A64-A805-18E70B31D425}"/>
-              </a:ext>
-            </a:extLst>
-          </p:cNvPr>
-          <p:cNvSpPr/>
-          <p:nvPr/>
-        </p:nvSpPr>
-        <p:spPr>
-          <a:xfrm>
-            <a:off x="7093684" y="5596939"/>
-            <a:ext cx="1841679" cy="914400"/>
-          </a:xfrm>
-          <a:prstGeom prst="diamond">
-            <a:avLst/>
-          </a:prstGeom>
-        </p:spPr>
-        <p:style>
-          <a:lnRef idx="2">
-            <a:schemeClr val="accent6"/>
-          </a:lnRef>
-          <a:fillRef idx="1">
-            <a:schemeClr val="lt1"/>
-          </a:fillRef>
-          <a:effectRef idx="0">
-            <a:schemeClr val="accent6"/>
-          </a:effectRef>
-          <a:fontRef idx="minor">
-            <a:schemeClr val="dk1"/>
-          </a:fontRef>
-        </p:style>
-        <p:txBody>
-          <a:bodyPr rtlCol="0" anchor="ctr"/>
-          <a:lstStyle/>
-          <a:p>
-            <a:pPr algn="ctr"/>
-            <a:r>
-              <a:rPr lang="en-US" sz="1200" dirty="0" err="1"/>
-              <a:t>Alokasi</a:t>
-            </a:r>
-            <a:r>
-              <a:rPr lang="en-US" sz="1200" dirty="0"/>
-              <a:t> </a:t>
-            </a:r>
-            <a:r>
-              <a:rPr lang="en-US" sz="1200" dirty="0" err="1"/>
-              <a:t>Kendaraan</a:t>
-            </a:r>
-            <a:endParaRPr lang="en-US" sz="1200" dirty="0"/>
-          </a:p>
-        </p:txBody>
-      </p:sp>
-      <p:cxnSp>
-        <p:nvCxnSpPr>
-          <p:cNvPr id="105" name="Straight Connector 104">
-            <a:extLst>
-              <a:ext uri="{FF2B5EF4-FFF2-40B4-BE49-F238E27FC236}">
-                <a16:creationId xmlns:a16="http://schemas.microsoft.com/office/drawing/2014/main" id="{8AD42A0F-EFF2-4854-90BB-78D1B35D6031}"/>
-              </a:ext>
-            </a:extLst>
-          </p:cNvPr>
-          <p:cNvCxnSpPr>
-            <a:cxnSpLocks/>
-            <a:stCxn id="17" idx="1"/>
-            <a:endCxn id="23" idx="3"/>
-          </p:cNvCxnSpPr>
-          <p:nvPr/>
-        </p:nvCxnSpPr>
-        <p:spPr>
-          <a:xfrm flipH="1" flipV="1">
-            <a:off x="5970862" y="5057424"/>
-            <a:ext cx="935971" cy="10950"/>
-          </a:xfrm>
-          <a:prstGeom prst="line">
-            <a:avLst/>
-          </a:prstGeom>
-        </p:spPr>
-        <p:style>
-          <a:lnRef idx="1">
-            <a:schemeClr val="accent1"/>
-          </a:lnRef>
-          <a:fillRef idx="0">
-            <a:schemeClr val="accent1"/>
-          </a:fillRef>
-          <a:effectRef idx="0">
-            <a:schemeClr val="accent1"/>
-          </a:effectRef>
-          <a:fontRef idx="minor">
-            <a:schemeClr val="tx1"/>
-          </a:fontRef>
-        </p:style>
-      </p:cxnSp>
-      <p:cxnSp>
-        <p:nvCxnSpPr>
-          <p:cNvPr id="107" name="Straight Connector 106">
-            <a:extLst>
-              <a:ext uri="{FF2B5EF4-FFF2-40B4-BE49-F238E27FC236}">
-                <a16:creationId xmlns:a16="http://schemas.microsoft.com/office/drawing/2014/main" id="{06BCB15F-37EE-45C5-B716-6997CEFC4B7B}"/>
-              </a:ext>
-            </a:extLst>
-          </p:cNvPr>
-          <p:cNvCxnSpPr>
-            <a:cxnSpLocks/>
-            <a:stCxn id="23" idx="1"/>
-            <a:endCxn id="15" idx="3"/>
-          </p:cNvCxnSpPr>
-          <p:nvPr/>
-        </p:nvCxnSpPr>
-        <p:spPr>
-          <a:xfrm flipH="1">
-            <a:off x="3206838" y="5057424"/>
-            <a:ext cx="922345" cy="11918"/>
-          </a:xfrm>
-          <a:prstGeom prst="line">
-            <a:avLst/>
-          </a:prstGeom>
-        </p:spPr>
-        <p:style>
-          <a:lnRef idx="1">
-            <a:schemeClr val="accent1"/>
-          </a:lnRef>
-          <a:fillRef idx="0">
-            <a:schemeClr val="accent1"/>
-          </a:fillRef>
-          <a:effectRef idx="0">
-            <a:schemeClr val="accent1"/>
-          </a:effectRef>
-          <a:fontRef idx="minor">
-            <a:schemeClr val="tx1"/>
-          </a:fontRef>
-        </p:style>
-      </p:cxnSp>
-      <p:cxnSp>
-        <p:nvCxnSpPr>
-          <p:cNvPr id="112" name="Straight Connector 111">
-            <a:extLst>
-              <a:ext uri="{FF2B5EF4-FFF2-40B4-BE49-F238E27FC236}">
-                <a16:creationId xmlns:a16="http://schemas.microsoft.com/office/drawing/2014/main" id="{0A363CDB-77F2-45BA-B43B-86DF1415D599}"/>
-              </a:ext>
-            </a:extLst>
-          </p:cNvPr>
-          <p:cNvCxnSpPr>
-            <a:cxnSpLocks/>
-            <a:stCxn id="17" idx="0"/>
-            <a:endCxn id="4" idx="2"/>
-          </p:cNvCxnSpPr>
-          <p:nvPr/>
-        </p:nvCxnSpPr>
-        <p:spPr>
-          <a:xfrm flipH="1" flipV="1">
-            <a:off x="5044226" y="1171977"/>
-            <a:ext cx="2970298" cy="3664577"/>
-          </a:xfrm>
-          <a:prstGeom prst="line">
-            <a:avLst/>
-          </a:prstGeom>
-        </p:spPr>
-        <p:style>
-          <a:lnRef idx="1">
-            <a:schemeClr val="accent1"/>
-          </a:lnRef>
-          <a:fillRef idx="0">
-            <a:schemeClr val="accent1"/>
-          </a:fillRef>
-          <a:effectRef idx="0">
-            <a:schemeClr val="accent1"/>
-          </a:effectRef>
-          <a:fontRef idx="minor">
-            <a:schemeClr val="tx1"/>
-          </a:fontRef>
-        </p:style>
-      </p:cxnSp>
-      <p:cxnSp>
-        <p:nvCxnSpPr>
-          <p:cNvPr id="114" name="Straight Connector 113">
-            <a:extLst>
-              <a:ext uri="{FF2B5EF4-FFF2-40B4-BE49-F238E27FC236}">
-                <a16:creationId xmlns:a16="http://schemas.microsoft.com/office/drawing/2014/main" id="{C0A2F0C3-1A6D-4FE4-BB67-EC63F65C2784}"/>
-              </a:ext>
-            </a:extLst>
-          </p:cNvPr>
-          <p:cNvCxnSpPr>
-            <a:cxnSpLocks/>
-            <a:stCxn id="17" idx="0"/>
-            <a:endCxn id="6" idx="2"/>
-          </p:cNvCxnSpPr>
-          <p:nvPr/>
-        </p:nvCxnSpPr>
-        <p:spPr>
-          <a:xfrm flipH="1" flipV="1">
-            <a:off x="5044225" y="2543577"/>
-            <a:ext cx="2970299" cy="2292977"/>
-          </a:xfrm>
-          <a:prstGeom prst="line">
-            <a:avLst/>
-          </a:prstGeom>
-        </p:spPr>
-        <p:style>
-          <a:lnRef idx="1">
-            <a:schemeClr val="accent1"/>
-          </a:lnRef>
-          <a:fillRef idx="0">
-            <a:schemeClr val="accent1"/>
-          </a:fillRef>
-          <a:effectRef idx="0">
-            <a:schemeClr val="accent1"/>
-          </a:effectRef>
-          <a:fontRef idx="minor">
-            <a:schemeClr val="tx1"/>
-          </a:fontRef>
-        </p:style>
-      </p:cxnSp>
-      <p:cxnSp>
-        <p:nvCxnSpPr>
-          <p:cNvPr id="154" name="Straight Connector 153">
-            <a:extLst>
-              <a:ext uri="{FF2B5EF4-FFF2-40B4-BE49-F238E27FC236}">
-                <a16:creationId xmlns:a16="http://schemas.microsoft.com/office/drawing/2014/main" id="{9DCF6BAA-6796-4780-B273-1B90CE5CB93E}"/>
-              </a:ext>
-            </a:extLst>
-          </p:cNvPr>
-          <p:cNvCxnSpPr>
-            <a:stCxn id="17" idx="0"/>
-            <a:endCxn id="10" idx="3"/>
-          </p:cNvCxnSpPr>
-          <p:nvPr/>
-        </p:nvCxnSpPr>
-        <p:spPr>
-          <a:xfrm flipH="1" flipV="1">
-            <a:off x="4123385" y="2776630"/>
-            <a:ext cx="3891139" cy="2059924"/>
-          </a:xfrm>
-          <a:prstGeom prst="line">
-            <a:avLst/>
-          </a:prstGeom>
-        </p:spPr>
-        <p:style>
-          <a:lnRef idx="1">
-            <a:schemeClr val="accent1"/>
-          </a:lnRef>
-          <a:fillRef idx="0">
-            <a:schemeClr val="accent1"/>
-          </a:fillRef>
-          <a:effectRef idx="0">
-            <a:schemeClr val="accent1"/>
-          </a:effectRef>
-          <a:fontRef idx="minor">
-            <a:schemeClr val="tx1"/>
-          </a:fontRef>
-        </p:style>
-      </p:cxnSp>
-      <p:cxnSp>
-        <p:nvCxnSpPr>
-          <p:cNvPr id="156" name="Straight Connector 155">
-            <a:extLst>
-              <a:ext uri="{FF2B5EF4-FFF2-40B4-BE49-F238E27FC236}">
-                <a16:creationId xmlns:a16="http://schemas.microsoft.com/office/drawing/2014/main" id="{49038BFD-B06E-4F7B-BEAA-A88D234177BC}"/>
-              </a:ext>
-            </a:extLst>
-          </p:cNvPr>
-          <p:cNvCxnSpPr>
-            <a:cxnSpLocks/>
-            <a:stCxn id="17" idx="0"/>
-            <a:endCxn id="8" idx="3"/>
-          </p:cNvCxnSpPr>
-          <p:nvPr/>
-        </p:nvCxnSpPr>
-        <p:spPr>
-          <a:xfrm flipH="1" flipV="1">
-            <a:off x="1916586" y="3210594"/>
-            <a:ext cx="6097938" cy="1625960"/>
-          </a:xfrm>
-          <a:prstGeom prst="line">
-            <a:avLst/>
-          </a:prstGeom>
-        </p:spPr>
-        <p:style>
-          <a:lnRef idx="1">
-            <a:schemeClr val="accent1"/>
-          </a:lnRef>
-          <a:fillRef idx="0">
-            <a:schemeClr val="accent1"/>
-          </a:fillRef>
-          <a:effectRef idx="0">
-            <a:schemeClr val="accent1"/>
-          </a:effectRef>
-          <a:fontRef idx="minor">
-            <a:schemeClr val="tx1"/>
-          </a:fontRef>
-        </p:style>
-      </p:cxnSp>
+        </p:grpSpPr>
+        <p:sp>
+          <p:nvSpPr>
+            <p:cNvPr id="4" name="Diamond 3">
+              <a:extLst>
+                <a:ext uri="{FF2B5EF4-FFF2-40B4-BE49-F238E27FC236}">
+                  <a16:creationId xmlns:a16="http://schemas.microsoft.com/office/drawing/2014/main" id="{128ACD66-3CB1-4ACA-B10A-529D0B7D8D95}"/>
+                </a:ext>
+              </a:extLst>
+            </p:cNvPr>
+            <p:cNvSpPr/>
+            <p:nvPr/>
+          </p:nvSpPr>
+          <p:spPr>
+            <a:xfrm>
+              <a:off x="4123386" y="257577"/>
+              <a:ext cx="1841679" cy="914400"/>
+            </a:xfrm>
+            <a:prstGeom prst="diamond">
+              <a:avLst/>
+            </a:prstGeom>
+          </p:spPr>
+          <p:style>
+            <a:lnRef idx="2">
+              <a:schemeClr val="accent6"/>
+            </a:lnRef>
+            <a:fillRef idx="1">
+              <a:schemeClr val="lt1"/>
+            </a:fillRef>
+            <a:effectRef idx="0">
+              <a:schemeClr val="accent6"/>
+            </a:effectRef>
+            <a:fontRef idx="minor">
+              <a:schemeClr val="dk1"/>
+            </a:fontRef>
+          </p:style>
+          <p:txBody>
+            <a:bodyPr rtlCol="0" anchor="ctr"/>
+            <a:lstStyle/>
+            <a:p>
+              <a:pPr algn="ctr"/>
+              <a:r>
+                <a:rPr lang="en-US" sz="1200" dirty="0" err="1"/>
+                <a:t>Jual</a:t>
+              </a:r>
+              <a:r>
+                <a:rPr lang="en-US" sz="1200" dirty="0"/>
+                <a:t> </a:t>
+              </a:r>
+              <a:r>
+                <a:rPr lang="en-US" sz="1200" dirty="0" err="1"/>
+                <a:t>Barang</a:t>
+              </a:r>
+              <a:endParaRPr lang="en-US" sz="1200" dirty="0"/>
+            </a:p>
+          </p:txBody>
+        </p:sp>
+        <p:sp>
+          <p:nvSpPr>
+            <p:cNvPr id="6" name="Diamond 5">
+              <a:extLst>
+                <a:ext uri="{FF2B5EF4-FFF2-40B4-BE49-F238E27FC236}">
+                  <a16:creationId xmlns:a16="http://schemas.microsoft.com/office/drawing/2014/main" id="{E8765C0D-1ED5-495F-9012-2F25F6B7AB1A}"/>
+                </a:ext>
+              </a:extLst>
+            </p:cNvPr>
+            <p:cNvSpPr/>
+            <p:nvPr/>
+          </p:nvSpPr>
+          <p:spPr>
+            <a:xfrm>
+              <a:off x="4123385" y="1629177"/>
+              <a:ext cx="1841679" cy="914400"/>
+            </a:xfrm>
+            <a:prstGeom prst="diamond">
+              <a:avLst/>
+            </a:prstGeom>
+          </p:spPr>
+          <p:style>
+            <a:lnRef idx="2">
+              <a:schemeClr val="accent6"/>
+            </a:lnRef>
+            <a:fillRef idx="1">
+              <a:schemeClr val="lt1"/>
+            </a:fillRef>
+            <a:effectRef idx="0">
+              <a:schemeClr val="accent6"/>
+            </a:effectRef>
+            <a:fontRef idx="minor">
+              <a:schemeClr val="dk1"/>
+            </a:fontRef>
+          </p:style>
+          <p:txBody>
+            <a:bodyPr rtlCol="0" anchor="ctr"/>
+            <a:lstStyle/>
+            <a:p>
+              <a:pPr algn="ctr"/>
+              <a:r>
+                <a:rPr lang="en-US" sz="1200" dirty="0" err="1"/>
+                <a:t>Beli</a:t>
+              </a:r>
+              <a:r>
+                <a:rPr lang="en-US" sz="1200" dirty="0"/>
+                <a:t> </a:t>
+              </a:r>
+              <a:r>
+                <a:rPr lang="en-US" sz="1200" dirty="0" err="1"/>
+                <a:t>Barang</a:t>
+              </a:r>
+              <a:endParaRPr lang="en-US" sz="1200" dirty="0"/>
+            </a:p>
+          </p:txBody>
+        </p:sp>
+        <p:sp>
+          <p:nvSpPr>
+            <p:cNvPr id="8" name="Diamond 7">
+              <a:extLst>
+                <a:ext uri="{FF2B5EF4-FFF2-40B4-BE49-F238E27FC236}">
+                  <a16:creationId xmlns:a16="http://schemas.microsoft.com/office/drawing/2014/main" id="{958A0FB2-4B5E-47A8-BD15-A84027BDE666}"/>
+                </a:ext>
+              </a:extLst>
+            </p:cNvPr>
+            <p:cNvSpPr/>
+            <p:nvPr/>
+          </p:nvSpPr>
+          <p:spPr>
+            <a:xfrm>
+              <a:off x="74907" y="2753394"/>
+              <a:ext cx="1841679" cy="914400"/>
+            </a:xfrm>
+            <a:prstGeom prst="diamond">
+              <a:avLst/>
+            </a:prstGeom>
+          </p:spPr>
+          <p:style>
+            <a:lnRef idx="2">
+              <a:schemeClr val="accent6"/>
+            </a:lnRef>
+            <a:fillRef idx="1">
+              <a:schemeClr val="lt1"/>
+            </a:fillRef>
+            <a:effectRef idx="0">
+              <a:schemeClr val="accent6"/>
+            </a:effectRef>
+            <a:fontRef idx="minor">
+              <a:schemeClr val="dk1"/>
+            </a:fontRef>
+          </p:style>
+          <p:txBody>
+            <a:bodyPr rtlCol="0" anchor="ctr"/>
+            <a:lstStyle/>
+            <a:p>
+              <a:pPr algn="ctr"/>
+              <a:r>
+                <a:rPr lang="en-US" sz="1200" dirty="0" err="1"/>
+                <a:t>Barang</a:t>
+              </a:r>
+              <a:r>
+                <a:rPr lang="en-US" sz="1200" dirty="0"/>
+                <a:t> </a:t>
+              </a:r>
+              <a:r>
+                <a:rPr lang="en-US" sz="1200" dirty="0" err="1"/>
+                <a:t>Masuk</a:t>
+              </a:r>
+              <a:endParaRPr lang="en-US" sz="1200" dirty="0"/>
+            </a:p>
+          </p:txBody>
+        </p:sp>
+        <p:sp>
+          <p:nvSpPr>
+            <p:cNvPr id="10" name="Diamond 9">
+              <a:extLst>
+                <a:ext uri="{FF2B5EF4-FFF2-40B4-BE49-F238E27FC236}">
+                  <a16:creationId xmlns:a16="http://schemas.microsoft.com/office/drawing/2014/main" id="{D6473FE3-E4F5-4833-BBE0-2794F94C4C16}"/>
+                </a:ext>
+              </a:extLst>
+            </p:cNvPr>
+            <p:cNvSpPr/>
+            <p:nvPr/>
+          </p:nvSpPr>
+          <p:spPr>
+            <a:xfrm>
+              <a:off x="2281706" y="2319430"/>
+              <a:ext cx="1841679" cy="914400"/>
+            </a:xfrm>
+            <a:prstGeom prst="diamond">
+              <a:avLst/>
+            </a:prstGeom>
+          </p:spPr>
+          <p:style>
+            <a:lnRef idx="2">
+              <a:schemeClr val="accent6"/>
+            </a:lnRef>
+            <a:fillRef idx="1">
+              <a:schemeClr val="lt1"/>
+            </a:fillRef>
+            <a:effectRef idx="0">
+              <a:schemeClr val="accent6"/>
+            </a:effectRef>
+            <a:fontRef idx="minor">
+              <a:schemeClr val="dk1"/>
+            </a:fontRef>
+          </p:style>
+          <p:txBody>
+            <a:bodyPr rtlCol="0" anchor="ctr"/>
+            <a:lstStyle/>
+            <a:p>
+              <a:pPr algn="ctr"/>
+              <a:r>
+                <a:rPr lang="en-US" sz="1200" dirty="0" err="1"/>
+                <a:t>Barang</a:t>
+              </a:r>
+              <a:r>
+                <a:rPr lang="en-US" sz="1200" dirty="0"/>
+                <a:t> </a:t>
+              </a:r>
+              <a:r>
+                <a:rPr lang="en-US" sz="1200" dirty="0" err="1"/>
+                <a:t>Keluar</a:t>
+              </a:r>
+              <a:endParaRPr lang="en-US" sz="1200" dirty="0"/>
+            </a:p>
+          </p:txBody>
+        </p:sp>
+        <p:sp>
+          <p:nvSpPr>
+            <p:cNvPr id="11" name="Rectangle 10">
+              <a:extLst>
+                <a:ext uri="{FF2B5EF4-FFF2-40B4-BE49-F238E27FC236}">
+                  <a16:creationId xmlns:a16="http://schemas.microsoft.com/office/drawing/2014/main" id="{A1AE0B0D-791A-44FC-9FFE-21A913FDE358}"/>
+                </a:ext>
+              </a:extLst>
+            </p:cNvPr>
+            <p:cNvSpPr/>
+            <p:nvPr/>
+          </p:nvSpPr>
+          <p:spPr>
+            <a:xfrm>
+              <a:off x="991456" y="1171977"/>
+              <a:ext cx="2215382" cy="463640"/>
+            </a:xfrm>
+            <a:prstGeom prst="rect">
+              <a:avLst/>
+            </a:prstGeom>
+          </p:spPr>
+          <p:style>
+            <a:lnRef idx="2">
+              <a:schemeClr val="accent6"/>
+            </a:lnRef>
+            <a:fillRef idx="1">
+              <a:schemeClr val="lt1"/>
+            </a:fillRef>
+            <a:effectRef idx="0">
+              <a:schemeClr val="accent6"/>
+            </a:effectRef>
+            <a:fontRef idx="minor">
+              <a:schemeClr val="dk1"/>
+            </a:fontRef>
+          </p:style>
+          <p:txBody>
+            <a:bodyPr rtlCol="0" anchor="ctr"/>
+            <a:lstStyle/>
+            <a:p>
+              <a:pPr algn="ctr"/>
+              <a:r>
+                <a:rPr lang="en-US" sz="1200" dirty="0" err="1"/>
+                <a:t>Produk</a:t>
+              </a:r>
+              <a:endParaRPr lang="en-US" sz="1200" dirty="0"/>
+            </a:p>
+          </p:txBody>
+        </p:sp>
+        <p:sp>
+          <p:nvSpPr>
+            <p:cNvPr id="13" name="Rectangle 12">
+              <a:extLst>
+                <a:ext uri="{FF2B5EF4-FFF2-40B4-BE49-F238E27FC236}">
+                  <a16:creationId xmlns:a16="http://schemas.microsoft.com/office/drawing/2014/main" id="{2AFEA10D-68F9-4DD3-B20F-FAFE8816B0B3}"/>
+                </a:ext>
+              </a:extLst>
+            </p:cNvPr>
+            <p:cNvSpPr/>
+            <p:nvPr/>
+          </p:nvSpPr>
+          <p:spPr>
+            <a:xfrm>
+              <a:off x="8014524" y="1171977"/>
+              <a:ext cx="2215382" cy="463640"/>
+            </a:xfrm>
+            <a:prstGeom prst="rect">
+              <a:avLst/>
+            </a:prstGeom>
+          </p:spPr>
+          <p:style>
+            <a:lnRef idx="2">
+              <a:schemeClr val="accent6"/>
+            </a:lnRef>
+            <a:fillRef idx="1">
+              <a:schemeClr val="lt1"/>
+            </a:fillRef>
+            <a:effectRef idx="0">
+              <a:schemeClr val="accent6"/>
+            </a:effectRef>
+            <a:fontRef idx="minor">
+              <a:schemeClr val="dk1"/>
+            </a:fontRef>
+          </p:style>
+          <p:txBody>
+            <a:bodyPr rtlCol="0" anchor="ctr"/>
+            <a:lstStyle/>
+            <a:p>
+              <a:pPr algn="ctr"/>
+              <a:r>
+                <a:rPr lang="en-US" sz="1200" dirty="0"/>
+                <a:t>Mitra</a:t>
+              </a:r>
+            </a:p>
+          </p:txBody>
+        </p:sp>
+        <p:sp>
+          <p:nvSpPr>
+            <p:cNvPr id="15" name="Rectangle 14">
+              <a:extLst>
+                <a:ext uri="{FF2B5EF4-FFF2-40B4-BE49-F238E27FC236}">
+                  <a16:creationId xmlns:a16="http://schemas.microsoft.com/office/drawing/2014/main" id="{F9A57C6B-22E1-498E-9B16-185770D1357D}"/>
+                </a:ext>
+              </a:extLst>
+            </p:cNvPr>
+            <p:cNvSpPr/>
+            <p:nvPr/>
+          </p:nvSpPr>
+          <p:spPr>
+            <a:xfrm>
+              <a:off x="991456" y="4837522"/>
+              <a:ext cx="2215382" cy="463640"/>
+            </a:xfrm>
+            <a:prstGeom prst="rect">
+              <a:avLst/>
+            </a:prstGeom>
+          </p:spPr>
+          <p:style>
+            <a:lnRef idx="2">
+              <a:schemeClr val="accent6"/>
+            </a:lnRef>
+            <a:fillRef idx="1">
+              <a:schemeClr val="lt1"/>
+            </a:fillRef>
+            <a:effectRef idx="0">
+              <a:schemeClr val="accent6"/>
+            </a:effectRef>
+            <a:fontRef idx="minor">
+              <a:schemeClr val="dk1"/>
+            </a:fontRef>
+          </p:style>
+          <p:txBody>
+            <a:bodyPr rtlCol="0" anchor="ctr"/>
+            <a:lstStyle/>
+            <a:p>
+              <a:pPr algn="ctr"/>
+              <a:r>
+                <a:rPr lang="en-US" sz="1200" dirty="0"/>
+                <a:t>Gudang</a:t>
+              </a:r>
+            </a:p>
+          </p:txBody>
+        </p:sp>
+        <p:sp>
+          <p:nvSpPr>
+            <p:cNvPr id="17" name="Rectangle 16">
+              <a:extLst>
+                <a:ext uri="{FF2B5EF4-FFF2-40B4-BE49-F238E27FC236}">
+                  <a16:creationId xmlns:a16="http://schemas.microsoft.com/office/drawing/2014/main" id="{34462B06-036E-4FA2-8A53-E1851DAD4FFB}"/>
+                </a:ext>
+              </a:extLst>
+            </p:cNvPr>
+            <p:cNvSpPr/>
+            <p:nvPr/>
+          </p:nvSpPr>
+          <p:spPr>
+            <a:xfrm>
+              <a:off x="6906833" y="4836554"/>
+              <a:ext cx="2215382" cy="463640"/>
+            </a:xfrm>
+            <a:prstGeom prst="rect">
+              <a:avLst/>
+            </a:prstGeom>
+          </p:spPr>
+          <p:style>
+            <a:lnRef idx="2">
+              <a:schemeClr val="accent6"/>
+            </a:lnRef>
+            <a:fillRef idx="1">
+              <a:schemeClr val="lt1"/>
+            </a:fillRef>
+            <a:effectRef idx="0">
+              <a:schemeClr val="accent6"/>
+            </a:effectRef>
+            <a:fontRef idx="minor">
+              <a:schemeClr val="dk1"/>
+            </a:fontRef>
+          </p:style>
+          <p:txBody>
+            <a:bodyPr rtlCol="0" anchor="ctr"/>
+            <a:lstStyle/>
+            <a:p>
+              <a:pPr algn="ctr"/>
+              <a:r>
+                <a:rPr lang="en-US" sz="1200" dirty="0" err="1"/>
+                <a:t>Pegawai</a:t>
+              </a:r>
+              <a:endParaRPr lang="en-US" sz="1200" dirty="0"/>
+            </a:p>
+          </p:txBody>
+        </p:sp>
+        <p:sp>
+          <p:nvSpPr>
+            <p:cNvPr id="19" name="Rectangle 18">
+              <a:extLst>
+                <a:ext uri="{FF2B5EF4-FFF2-40B4-BE49-F238E27FC236}">
+                  <a16:creationId xmlns:a16="http://schemas.microsoft.com/office/drawing/2014/main" id="{B1A6F8BB-3D94-4022-88BF-A314C941C098}"/>
+                </a:ext>
+              </a:extLst>
+            </p:cNvPr>
+            <p:cNvSpPr/>
+            <p:nvPr/>
+          </p:nvSpPr>
+          <p:spPr>
+            <a:xfrm>
+              <a:off x="9309123" y="4810796"/>
+              <a:ext cx="2215382" cy="463640"/>
+            </a:xfrm>
+            <a:prstGeom prst="rect">
+              <a:avLst/>
+            </a:prstGeom>
+          </p:spPr>
+          <p:style>
+            <a:lnRef idx="2">
+              <a:schemeClr val="accent6"/>
+            </a:lnRef>
+            <a:fillRef idx="1">
+              <a:schemeClr val="lt1"/>
+            </a:fillRef>
+            <a:effectRef idx="0">
+              <a:schemeClr val="accent6"/>
+            </a:effectRef>
+            <a:fontRef idx="minor">
+              <a:schemeClr val="dk1"/>
+            </a:fontRef>
+          </p:style>
+          <p:txBody>
+            <a:bodyPr rtlCol="0" anchor="ctr"/>
+            <a:lstStyle/>
+            <a:p>
+              <a:pPr algn="ctr"/>
+              <a:r>
+                <a:rPr lang="en-US" sz="1200" dirty="0" err="1"/>
+                <a:t>Aset</a:t>
+              </a:r>
+              <a:endParaRPr lang="en-US" sz="1200" dirty="0"/>
+            </a:p>
+          </p:txBody>
+        </p:sp>
+        <p:sp>
+          <p:nvSpPr>
+            <p:cNvPr id="21" name="Rectangle 20">
+              <a:extLst>
+                <a:ext uri="{FF2B5EF4-FFF2-40B4-BE49-F238E27FC236}">
+                  <a16:creationId xmlns:a16="http://schemas.microsoft.com/office/drawing/2014/main" id="{F8C3CE20-53AC-4E44-B5DF-149FA4F348ED}"/>
+                </a:ext>
+              </a:extLst>
+            </p:cNvPr>
+            <p:cNvSpPr/>
+            <p:nvPr/>
+          </p:nvSpPr>
+          <p:spPr>
+            <a:xfrm>
+              <a:off x="9215586" y="5815612"/>
+              <a:ext cx="2215382" cy="463640"/>
+            </a:xfrm>
+            <a:prstGeom prst="rect">
+              <a:avLst/>
+            </a:prstGeom>
+          </p:spPr>
+          <p:style>
+            <a:lnRef idx="2">
+              <a:schemeClr val="accent6"/>
+            </a:lnRef>
+            <a:fillRef idx="1">
+              <a:schemeClr val="lt1"/>
+            </a:fillRef>
+            <a:effectRef idx="0">
+              <a:schemeClr val="accent6"/>
+            </a:effectRef>
+            <a:fontRef idx="minor">
+              <a:schemeClr val="dk1"/>
+            </a:fontRef>
+          </p:style>
+          <p:txBody>
+            <a:bodyPr rtlCol="0" anchor="ctr"/>
+            <a:lstStyle/>
+            <a:p>
+              <a:pPr algn="ctr"/>
+              <a:r>
+                <a:rPr lang="en-US" sz="1200" dirty="0" err="1"/>
+                <a:t>Kendaraan</a:t>
+              </a:r>
+              <a:endParaRPr lang="en-US" sz="1200" dirty="0"/>
+            </a:p>
+          </p:txBody>
+        </p:sp>
+        <p:sp>
+          <p:nvSpPr>
+            <p:cNvPr id="23" name="Diamond 22">
+              <a:extLst>
+                <a:ext uri="{FF2B5EF4-FFF2-40B4-BE49-F238E27FC236}">
+                  <a16:creationId xmlns:a16="http://schemas.microsoft.com/office/drawing/2014/main" id="{4CB4C4D4-12BB-4E22-8B58-BBDA806C3518}"/>
+                </a:ext>
+              </a:extLst>
+            </p:cNvPr>
+            <p:cNvSpPr/>
+            <p:nvPr/>
+          </p:nvSpPr>
+          <p:spPr>
+            <a:xfrm>
+              <a:off x="4129183" y="4600224"/>
+              <a:ext cx="1841679" cy="914400"/>
+            </a:xfrm>
+            <a:prstGeom prst="diamond">
+              <a:avLst/>
+            </a:prstGeom>
+          </p:spPr>
+          <p:style>
+            <a:lnRef idx="2">
+              <a:schemeClr val="accent6"/>
+            </a:lnRef>
+            <a:fillRef idx="1">
+              <a:schemeClr val="lt1"/>
+            </a:fillRef>
+            <a:effectRef idx="0">
+              <a:schemeClr val="accent6"/>
+            </a:effectRef>
+            <a:fontRef idx="minor">
+              <a:schemeClr val="dk1"/>
+            </a:fontRef>
+          </p:style>
+          <p:txBody>
+            <a:bodyPr rtlCol="0" anchor="ctr"/>
+            <a:lstStyle/>
+            <a:p>
+              <a:pPr algn="ctr"/>
+              <a:r>
+                <a:rPr lang="en-US" sz="1200" dirty="0" err="1"/>
+                <a:t>Penjaga</a:t>
+              </a:r>
+              <a:r>
+                <a:rPr lang="en-US" sz="1200" dirty="0"/>
+                <a:t> Gudang</a:t>
+              </a:r>
+            </a:p>
+          </p:txBody>
+        </p:sp>
+        <p:sp>
+          <p:nvSpPr>
+            <p:cNvPr id="25" name="Diamond 24">
+              <a:extLst>
+                <a:ext uri="{FF2B5EF4-FFF2-40B4-BE49-F238E27FC236}">
+                  <a16:creationId xmlns:a16="http://schemas.microsoft.com/office/drawing/2014/main" id="{088A7E3D-0276-47CC-BEFB-233B3DDF6FE0}"/>
+                </a:ext>
+              </a:extLst>
+            </p:cNvPr>
+            <p:cNvSpPr/>
+            <p:nvPr/>
+          </p:nvSpPr>
+          <p:spPr>
+            <a:xfrm>
+              <a:off x="7093684" y="2318464"/>
+              <a:ext cx="1841679" cy="914400"/>
+            </a:xfrm>
+            <a:prstGeom prst="diamond">
+              <a:avLst/>
+            </a:prstGeom>
+          </p:spPr>
+          <p:style>
+            <a:lnRef idx="2">
+              <a:schemeClr val="accent6"/>
+            </a:lnRef>
+            <a:fillRef idx="1">
+              <a:schemeClr val="lt1"/>
+            </a:fillRef>
+            <a:effectRef idx="0">
+              <a:schemeClr val="accent6"/>
+            </a:effectRef>
+            <a:fontRef idx="minor">
+              <a:schemeClr val="dk1"/>
+            </a:fontRef>
+          </p:style>
+          <p:txBody>
+            <a:bodyPr rtlCol="0" anchor="ctr"/>
+            <a:lstStyle/>
+            <a:p>
+              <a:pPr algn="ctr"/>
+              <a:r>
+                <a:rPr lang="en-US" sz="1200" dirty="0" err="1"/>
+                <a:t>Beli</a:t>
+              </a:r>
+              <a:r>
+                <a:rPr lang="en-US" sz="1200" dirty="0"/>
+                <a:t> </a:t>
+              </a:r>
+              <a:r>
+                <a:rPr lang="en-US" sz="1200" dirty="0" err="1"/>
+                <a:t>Aset</a:t>
+              </a:r>
+              <a:endParaRPr lang="en-US" sz="1200" dirty="0"/>
+            </a:p>
+          </p:txBody>
+        </p:sp>
+        <p:sp>
+          <p:nvSpPr>
+            <p:cNvPr id="27" name="Diamond 26">
+              <a:extLst>
+                <a:ext uri="{FF2B5EF4-FFF2-40B4-BE49-F238E27FC236}">
+                  <a16:creationId xmlns:a16="http://schemas.microsoft.com/office/drawing/2014/main" id="{72C7691E-702C-4A18-AA1B-49256D302BC0}"/>
+                </a:ext>
+              </a:extLst>
+            </p:cNvPr>
+            <p:cNvSpPr/>
+            <p:nvPr/>
+          </p:nvSpPr>
+          <p:spPr>
+            <a:xfrm>
+              <a:off x="9495809" y="2324904"/>
+              <a:ext cx="1841679" cy="914400"/>
+            </a:xfrm>
+            <a:prstGeom prst="diamond">
+              <a:avLst/>
+            </a:prstGeom>
+          </p:spPr>
+          <p:style>
+            <a:lnRef idx="2">
+              <a:schemeClr val="accent6"/>
+            </a:lnRef>
+            <a:fillRef idx="1">
+              <a:schemeClr val="lt1"/>
+            </a:fillRef>
+            <a:effectRef idx="0">
+              <a:schemeClr val="accent6"/>
+            </a:effectRef>
+            <a:fontRef idx="minor">
+              <a:schemeClr val="dk1"/>
+            </a:fontRef>
+          </p:style>
+          <p:txBody>
+            <a:bodyPr rtlCol="0" anchor="ctr"/>
+            <a:lstStyle/>
+            <a:p>
+              <a:pPr algn="ctr"/>
+              <a:r>
+                <a:rPr lang="en-US" sz="1200" dirty="0" err="1"/>
+                <a:t>Jual</a:t>
+              </a:r>
+              <a:r>
+                <a:rPr lang="en-US" sz="1200" dirty="0"/>
+                <a:t> </a:t>
+              </a:r>
+              <a:r>
+                <a:rPr lang="en-US" sz="1200" dirty="0" err="1"/>
+                <a:t>Aset</a:t>
+              </a:r>
+              <a:endParaRPr lang="en-US" sz="1200" dirty="0"/>
+            </a:p>
+          </p:txBody>
+        </p:sp>
+        <p:cxnSp>
+          <p:nvCxnSpPr>
+            <p:cNvPr id="29" name="Straight Connector 28">
+              <a:extLst>
+                <a:ext uri="{FF2B5EF4-FFF2-40B4-BE49-F238E27FC236}">
+                  <a16:creationId xmlns:a16="http://schemas.microsoft.com/office/drawing/2014/main" id="{14421C86-54EB-4F5E-B430-D9AC1D7B9FED}"/>
+                </a:ext>
+              </a:extLst>
+            </p:cNvPr>
+            <p:cNvCxnSpPr>
+              <a:stCxn id="8" idx="0"/>
+              <a:endCxn id="11" idx="2"/>
+            </p:cNvCxnSpPr>
+            <p:nvPr/>
+          </p:nvCxnSpPr>
+          <p:spPr>
+            <a:xfrm flipV="1">
+              <a:off x="995747" y="1635617"/>
+              <a:ext cx="1103400" cy="1117777"/>
+            </a:xfrm>
+            <a:prstGeom prst="line">
+              <a:avLst/>
+            </a:prstGeom>
+          </p:spPr>
+          <p:style>
+            <a:lnRef idx="1">
+              <a:schemeClr val="accent1"/>
+            </a:lnRef>
+            <a:fillRef idx="0">
+              <a:schemeClr val="accent1"/>
+            </a:fillRef>
+            <a:effectRef idx="0">
+              <a:schemeClr val="accent1"/>
+            </a:effectRef>
+            <a:fontRef idx="minor">
+              <a:schemeClr val="tx1"/>
+            </a:fontRef>
+          </p:style>
+        </p:cxnSp>
+        <p:cxnSp>
+          <p:nvCxnSpPr>
+            <p:cNvPr id="30" name="Straight Connector 29">
+              <a:extLst>
+                <a:ext uri="{FF2B5EF4-FFF2-40B4-BE49-F238E27FC236}">
+                  <a16:creationId xmlns:a16="http://schemas.microsoft.com/office/drawing/2014/main" id="{91457382-164E-4B41-A3B3-7FFFEDA6C387}"/>
+                </a:ext>
+              </a:extLst>
+            </p:cNvPr>
+            <p:cNvCxnSpPr>
+              <a:cxnSpLocks/>
+              <a:stCxn id="10" idx="0"/>
+              <a:endCxn id="11" idx="2"/>
+            </p:cNvCxnSpPr>
+            <p:nvPr/>
+          </p:nvCxnSpPr>
+          <p:spPr>
+            <a:xfrm flipH="1" flipV="1">
+              <a:off x="2099147" y="1635617"/>
+              <a:ext cx="1103399" cy="683813"/>
+            </a:xfrm>
+            <a:prstGeom prst="line">
+              <a:avLst/>
+            </a:prstGeom>
+          </p:spPr>
+          <p:style>
+            <a:lnRef idx="1">
+              <a:schemeClr val="accent1"/>
+            </a:lnRef>
+            <a:fillRef idx="0">
+              <a:schemeClr val="accent1"/>
+            </a:fillRef>
+            <a:effectRef idx="0">
+              <a:schemeClr val="accent1"/>
+            </a:effectRef>
+            <a:fontRef idx="minor">
+              <a:schemeClr val="tx1"/>
+            </a:fontRef>
+          </p:style>
+        </p:cxnSp>
+        <p:cxnSp>
+          <p:nvCxnSpPr>
+            <p:cNvPr id="33" name="Straight Connector 32">
+              <a:extLst>
+                <a:ext uri="{FF2B5EF4-FFF2-40B4-BE49-F238E27FC236}">
+                  <a16:creationId xmlns:a16="http://schemas.microsoft.com/office/drawing/2014/main" id="{FCBF5A17-A250-4D1B-AF8B-CEA0BFE44B18}"/>
+                </a:ext>
+              </a:extLst>
+            </p:cNvPr>
+            <p:cNvCxnSpPr>
+              <a:cxnSpLocks/>
+              <a:stCxn id="15" idx="0"/>
+              <a:endCxn id="10" idx="2"/>
+            </p:cNvCxnSpPr>
+            <p:nvPr/>
+          </p:nvCxnSpPr>
+          <p:spPr>
+            <a:xfrm flipV="1">
+              <a:off x="2099147" y="3233830"/>
+              <a:ext cx="1103399" cy="1603692"/>
+            </a:xfrm>
+            <a:prstGeom prst="line">
+              <a:avLst/>
+            </a:prstGeom>
+          </p:spPr>
+          <p:style>
+            <a:lnRef idx="1">
+              <a:schemeClr val="accent1"/>
+            </a:lnRef>
+            <a:fillRef idx="0">
+              <a:schemeClr val="accent1"/>
+            </a:fillRef>
+            <a:effectRef idx="0">
+              <a:schemeClr val="accent1"/>
+            </a:effectRef>
+            <a:fontRef idx="minor">
+              <a:schemeClr val="tx1"/>
+            </a:fontRef>
+          </p:style>
+        </p:cxnSp>
+        <p:cxnSp>
+          <p:nvCxnSpPr>
+            <p:cNvPr id="36" name="Straight Connector 35">
+              <a:extLst>
+                <a:ext uri="{FF2B5EF4-FFF2-40B4-BE49-F238E27FC236}">
+                  <a16:creationId xmlns:a16="http://schemas.microsoft.com/office/drawing/2014/main" id="{911FE92B-A204-4D52-905C-0A7B3B4643BC}"/>
+                </a:ext>
+              </a:extLst>
+            </p:cNvPr>
+            <p:cNvCxnSpPr>
+              <a:cxnSpLocks/>
+              <a:stCxn id="8" idx="2"/>
+              <a:endCxn id="15" idx="0"/>
+            </p:cNvCxnSpPr>
+            <p:nvPr/>
+          </p:nvCxnSpPr>
+          <p:spPr>
+            <a:xfrm>
+              <a:off x="995747" y="3667794"/>
+              <a:ext cx="1103400" cy="1169728"/>
+            </a:xfrm>
+            <a:prstGeom prst="line">
+              <a:avLst/>
+            </a:prstGeom>
+          </p:spPr>
+          <p:style>
+            <a:lnRef idx="1">
+              <a:schemeClr val="accent1"/>
+            </a:lnRef>
+            <a:fillRef idx="0">
+              <a:schemeClr val="accent1"/>
+            </a:fillRef>
+            <a:effectRef idx="0">
+              <a:schemeClr val="accent1"/>
+            </a:effectRef>
+            <a:fontRef idx="minor">
+              <a:schemeClr val="tx1"/>
+            </a:fontRef>
+          </p:style>
+        </p:cxnSp>
+        <p:cxnSp>
+          <p:nvCxnSpPr>
+            <p:cNvPr id="39" name="Straight Connector 38">
+              <a:extLst>
+                <a:ext uri="{FF2B5EF4-FFF2-40B4-BE49-F238E27FC236}">
+                  <a16:creationId xmlns:a16="http://schemas.microsoft.com/office/drawing/2014/main" id="{D93998A6-953D-4171-AF78-6A830D177025}"/>
+                </a:ext>
+              </a:extLst>
+            </p:cNvPr>
+            <p:cNvCxnSpPr>
+              <a:cxnSpLocks/>
+              <a:stCxn id="11" idx="3"/>
+              <a:endCxn id="4" idx="1"/>
+            </p:cNvCxnSpPr>
+            <p:nvPr/>
+          </p:nvCxnSpPr>
+          <p:spPr>
+            <a:xfrm flipV="1">
+              <a:off x="3206838" y="714777"/>
+              <a:ext cx="916548" cy="689020"/>
+            </a:xfrm>
+            <a:prstGeom prst="line">
+              <a:avLst/>
+            </a:prstGeom>
+          </p:spPr>
+          <p:style>
+            <a:lnRef idx="1">
+              <a:schemeClr val="accent1"/>
+            </a:lnRef>
+            <a:fillRef idx="0">
+              <a:schemeClr val="accent1"/>
+            </a:fillRef>
+            <a:effectRef idx="0">
+              <a:schemeClr val="accent1"/>
+            </a:effectRef>
+            <a:fontRef idx="minor">
+              <a:schemeClr val="tx1"/>
+            </a:fontRef>
+          </p:style>
+        </p:cxnSp>
+        <p:cxnSp>
+          <p:nvCxnSpPr>
+            <p:cNvPr id="43" name="Straight Connector 42">
+              <a:extLst>
+                <a:ext uri="{FF2B5EF4-FFF2-40B4-BE49-F238E27FC236}">
+                  <a16:creationId xmlns:a16="http://schemas.microsoft.com/office/drawing/2014/main" id="{98DF6F1F-FAE6-494C-8C20-764A1CE450EE}"/>
+                </a:ext>
+              </a:extLst>
+            </p:cNvPr>
+            <p:cNvCxnSpPr>
+              <a:cxnSpLocks/>
+              <a:stCxn id="11" idx="3"/>
+              <a:endCxn id="6" idx="1"/>
+            </p:cNvCxnSpPr>
+            <p:nvPr/>
+          </p:nvCxnSpPr>
+          <p:spPr>
+            <a:xfrm>
+              <a:off x="3206838" y="1403797"/>
+              <a:ext cx="916547" cy="682580"/>
+            </a:xfrm>
+            <a:prstGeom prst="line">
+              <a:avLst/>
+            </a:prstGeom>
+          </p:spPr>
+          <p:style>
+            <a:lnRef idx="1">
+              <a:schemeClr val="accent1"/>
+            </a:lnRef>
+            <a:fillRef idx="0">
+              <a:schemeClr val="accent1"/>
+            </a:fillRef>
+            <a:effectRef idx="0">
+              <a:schemeClr val="accent1"/>
+            </a:effectRef>
+            <a:fontRef idx="minor">
+              <a:schemeClr val="tx1"/>
+            </a:fontRef>
+          </p:style>
+        </p:cxnSp>
+        <p:cxnSp>
+          <p:nvCxnSpPr>
+            <p:cNvPr id="46" name="Straight Connector 45">
+              <a:extLst>
+                <a:ext uri="{FF2B5EF4-FFF2-40B4-BE49-F238E27FC236}">
+                  <a16:creationId xmlns:a16="http://schemas.microsoft.com/office/drawing/2014/main" id="{E14D408A-2C28-4034-9E7B-273065CF043D}"/>
+                </a:ext>
+              </a:extLst>
+            </p:cNvPr>
+            <p:cNvCxnSpPr>
+              <a:cxnSpLocks/>
+              <a:stCxn id="13" idx="1"/>
+              <a:endCxn id="4" idx="3"/>
+            </p:cNvCxnSpPr>
+            <p:nvPr/>
+          </p:nvCxnSpPr>
+          <p:spPr>
+            <a:xfrm flipH="1" flipV="1">
+              <a:off x="5965065" y="714777"/>
+              <a:ext cx="2049459" cy="689020"/>
+            </a:xfrm>
+            <a:prstGeom prst="line">
+              <a:avLst/>
+            </a:prstGeom>
+          </p:spPr>
+          <p:style>
+            <a:lnRef idx="1">
+              <a:schemeClr val="accent1"/>
+            </a:lnRef>
+            <a:fillRef idx="0">
+              <a:schemeClr val="accent1"/>
+            </a:fillRef>
+            <a:effectRef idx="0">
+              <a:schemeClr val="accent1"/>
+            </a:effectRef>
+            <a:fontRef idx="minor">
+              <a:schemeClr val="tx1"/>
+            </a:fontRef>
+          </p:style>
+        </p:cxnSp>
+        <p:cxnSp>
+          <p:nvCxnSpPr>
+            <p:cNvPr id="49" name="Straight Connector 48">
+              <a:extLst>
+                <a:ext uri="{FF2B5EF4-FFF2-40B4-BE49-F238E27FC236}">
+                  <a16:creationId xmlns:a16="http://schemas.microsoft.com/office/drawing/2014/main" id="{27A72982-5146-41F0-B8BD-B8D453610A1F}"/>
+                </a:ext>
+              </a:extLst>
+            </p:cNvPr>
+            <p:cNvCxnSpPr>
+              <a:cxnSpLocks/>
+              <a:stCxn id="6" idx="3"/>
+              <a:endCxn id="13" idx="1"/>
+            </p:cNvCxnSpPr>
+            <p:nvPr/>
+          </p:nvCxnSpPr>
+          <p:spPr>
+            <a:xfrm flipV="1">
+              <a:off x="5965064" y="1403797"/>
+              <a:ext cx="2049460" cy="682580"/>
+            </a:xfrm>
+            <a:prstGeom prst="line">
+              <a:avLst/>
+            </a:prstGeom>
+          </p:spPr>
+          <p:style>
+            <a:lnRef idx="1">
+              <a:schemeClr val="accent1"/>
+            </a:lnRef>
+            <a:fillRef idx="0">
+              <a:schemeClr val="accent1"/>
+            </a:fillRef>
+            <a:effectRef idx="0">
+              <a:schemeClr val="accent1"/>
+            </a:effectRef>
+            <a:fontRef idx="minor">
+              <a:schemeClr val="tx1"/>
+            </a:fontRef>
+          </p:style>
+        </p:cxnSp>
+        <p:cxnSp>
+          <p:nvCxnSpPr>
+            <p:cNvPr id="52" name="Straight Connector 51">
+              <a:extLst>
+                <a:ext uri="{FF2B5EF4-FFF2-40B4-BE49-F238E27FC236}">
+                  <a16:creationId xmlns:a16="http://schemas.microsoft.com/office/drawing/2014/main" id="{E23A9ED5-E77A-4DC4-B92B-AB29DE51A0B3}"/>
+                </a:ext>
+              </a:extLst>
+            </p:cNvPr>
+            <p:cNvCxnSpPr>
+              <a:cxnSpLocks/>
+              <a:stCxn id="25" idx="0"/>
+              <a:endCxn id="13" idx="2"/>
+            </p:cNvCxnSpPr>
+            <p:nvPr/>
+          </p:nvCxnSpPr>
+          <p:spPr>
+            <a:xfrm flipV="1">
+              <a:off x="8014524" y="1635617"/>
+              <a:ext cx="1107691" cy="682847"/>
+            </a:xfrm>
+            <a:prstGeom prst="line">
+              <a:avLst/>
+            </a:prstGeom>
+          </p:spPr>
+          <p:style>
+            <a:lnRef idx="1">
+              <a:schemeClr val="accent1"/>
+            </a:lnRef>
+            <a:fillRef idx="0">
+              <a:schemeClr val="accent1"/>
+            </a:fillRef>
+            <a:effectRef idx="0">
+              <a:schemeClr val="accent1"/>
+            </a:effectRef>
+            <a:fontRef idx="minor">
+              <a:schemeClr val="tx1"/>
+            </a:fontRef>
+          </p:style>
+        </p:cxnSp>
+        <p:cxnSp>
+          <p:nvCxnSpPr>
+            <p:cNvPr id="55" name="Straight Connector 54">
+              <a:extLst>
+                <a:ext uri="{FF2B5EF4-FFF2-40B4-BE49-F238E27FC236}">
+                  <a16:creationId xmlns:a16="http://schemas.microsoft.com/office/drawing/2014/main" id="{8575E8DE-4917-4775-9398-DC5B768270D8}"/>
+                </a:ext>
+              </a:extLst>
+            </p:cNvPr>
+            <p:cNvCxnSpPr>
+              <a:cxnSpLocks/>
+              <a:stCxn id="27" idx="0"/>
+              <a:endCxn id="13" idx="2"/>
+            </p:cNvCxnSpPr>
+            <p:nvPr/>
+          </p:nvCxnSpPr>
+          <p:spPr>
+            <a:xfrm flipH="1" flipV="1">
+              <a:off x="9122215" y="1635617"/>
+              <a:ext cx="1294434" cy="689287"/>
+            </a:xfrm>
+            <a:prstGeom prst="line">
+              <a:avLst/>
+            </a:prstGeom>
+          </p:spPr>
+          <p:style>
+            <a:lnRef idx="1">
+              <a:schemeClr val="accent1"/>
+            </a:lnRef>
+            <a:fillRef idx="0">
+              <a:schemeClr val="accent1"/>
+            </a:fillRef>
+            <a:effectRef idx="0">
+              <a:schemeClr val="accent1"/>
+            </a:effectRef>
+            <a:fontRef idx="minor">
+              <a:schemeClr val="tx1"/>
+            </a:fontRef>
+          </p:style>
+        </p:cxnSp>
+        <p:cxnSp>
+          <p:nvCxnSpPr>
+            <p:cNvPr id="58" name="Straight Connector 57">
+              <a:extLst>
+                <a:ext uri="{FF2B5EF4-FFF2-40B4-BE49-F238E27FC236}">
+                  <a16:creationId xmlns:a16="http://schemas.microsoft.com/office/drawing/2014/main" id="{BA31222F-0661-4126-A674-0E7BE295FA92}"/>
+                </a:ext>
+              </a:extLst>
+            </p:cNvPr>
+            <p:cNvCxnSpPr>
+              <a:cxnSpLocks/>
+              <a:stCxn id="17" idx="0"/>
+              <a:endCxn id="27" idx="2"/>
+            </p:cNvCxnSpPr>
+            <p:nvPr/>
+          </p:nvCxnSpPr>
+          <p:spPr>
+            <a:xfrm flipV="1">
+              <a:off x="8014524" y="3239304"/>
+              <a:ext cx="2402125" cy="1597250"/>
+            </a:xfrm>
+            <a:prstGeom prst="line">
+              <a:avLst/>
+            </a:prstGeom>
+          </p:spPr>
+          <p:style>
+            <a:lnRef idx="1">
+              <a:schemeClr val="accent1"/>
+            </a:lnRef>
+            <a:fillRef idx="0">
+              <a:schemeClr val="accent1"/>
+            </a:fillRef>
+            <a:effectRef idx="0">
+              <a:schemeClr val="accent1"/>
+            </a:effectRef>
+            <a:fontRef idx="minor">
+              <a:schemeClr val="tx1"/>
+            </a:fontRef>
+          </p:style>
+        </p:cxnSp>
+        <p:cxnSp>
+          <p:nvCxnSpPr>
+            <p:cNvPr id="61" name="Straight Connector 60">
+              <a:extLst>
+                <a:ext uri="{FF2B5EF4-FFF2-40B4-BE49-F238E27FC236}">
+                  <a16:creationId xmlns:a16="http://schemas.microsoft.com/office/drawing/2014/main" id="{D60A3DAA-31CF-4035-90C0-80C30314D686}"/>
+                </a:ext>
+              </a:extLst>
+            </p:cNvPr>
+            <p:cNvCxnSpPr>
+              <a:cxnSpLocks/>
+              <a:stCxn id="17" idx="0"/>
+              <a:endCxn id="25" idx="2"/>
+            </p:cNvCxnSpPr>
+            <p:nvPr/>
+          </p:nvCxnSpPr>
+          <p:spPr>
+            <a:xfrm flipV="1">
+              <a:off x="8014524" y="3232864"/>
+              <a:ext cx="0" cy="1603690"/>
+            </a:xfrm>
+            <a:prstGeom prst="line">
+              <a:avLst/>
+            </a:prstGeom>
+          </p:spPr>
+          <p:style>
+            <a:lnRef idx="1">
+              <a:schemeClr val="accent1"/>
+            </a:lnRef>
+            <a:fillRef idx="0">
+              <a:schemeClr val="accent1"/>
+            </a:fillRef>
+            <a:effectRef idx="0">
+              <a:schemeClr val="accent1"/>
+            </a:effectRef>
+            <a:fontRef idx="minor">
+              <a:schemeClr val="tx1"/>
+            </a:fontRef>
+          </p:style>
+        </p:cxnSp>
+        <p:cxnSp>
+          <p:nvCxnSpPr>
+            <p:cNvPr id="64" name="Straight Connector 63">
+              <a:extLst>
+                <a:ext uri="{FF2B5EF4-FFF2-40B4-BE49-F238E27FC236}">
+                  <a16:creationId xmlns:a16="http://schemas.microsoft.com/office/drawing/2014/main" id="{5863468D-3421-4D61-A264-C68E4C875E94}"/>
+                </a:ext>
+              </a:extLst>
+            </p:cNvPr>
+            <p:cNvCxnSpPr>
+              <a:cxnSpLocks/>
+              <a:stCxn id="19" idx="0"/>
+              <a:endCxn id="27" idx="2"/>
+            </p:cNvCxnSpPr>
+            <p:nvPr/>
+          </p:nvCxnSpPr>
+          <p:spPr>
+            <a:xfrm flipH="1" flipV="1">
+              <a:off x="10416649" y="3239304"/>
+              <a:ext cx="165" cy="1571492"/>
+            </a:xfrm>
+            <a:prstGeom prst="line">
+              <a:avLst/>
+            </a:prstGeom>
+          </p:spPr>
+          <p:style>
+            <a:lnRef idx="1">
+              <a:schemeClr val="accent1"/>
+            </a:lnRef>
+            <a:fillRef idx="0">
+              <a:schemeClr val="accent1"/>
+            </a:fillRef>
+            <a:effectRef idx="0">
+              <a:schemeClr val="accent1"/>
+            </a:effectRef>
+            <a:fontRef idx="minor">
+              <a:schemeClr val="tx1"/>
+            </a:fontRef>
+          </p:style>
+        </p:cxnSp>
+        <p:cxnSp>
+          <p:nvCxnSpPr>
+            <p:cNvPr id="67" name="Straight Connector 66">
+              <a:extLst>
+                <a:ext uri="{FF2B5EF4-FFF2-40B4-BE49-F238E27FC236}">
+                  <a16:creationId xmlns:a16="http://schemas.microsoft.com/office/drawing/2014/main" id="{3CCAF64A-2923-4EA7-8371-65E392C1E9FB}"/>
+                </a:ext>
+              </a:extLst>
+            </p:cNvPr>
+            <p:cNvCxnSpPr>
+              <a:cxnSpLocks/>
+              <a:stCxn id="19" idx="0"/>
+              <a:endCxn id="25" idx="2"/>
+            </p:cNvCxnSpPr>
+            <p:nvPr/>
+          </p:nvCxnSpPr>
+          <p:spPr>
+            <a:xfrm flipH="1" flipV="1">
+              <a:off x="8014524" y="3232864"/>
+              <a:ext cx="2402290" cy="1577932"/>
+            </a:xfrm>
+            <a:prstGeom prst="line">
+              <a:avLst/>
+            </a:prstGeom>
+          </p:spPr>
+          <p:style>
+            <a:lnRef idx="1">
+              <a:schemeClr val="accent1"/>
+            </a:lnRef>
+            <a:fillRef idx="0">
+              <a:schemeClr val="accent1"/>
+            </a:fillRef>
+            <a:effectRef idx="0">
+              <a:schemeClr val="accent1"/>
+            </a:effectRef>
+            <a:fontRef idx="minor">
+              <a:schemeClr val="tx1"/>
+            </a:fontRef>
+          </p:style>
+        </p:cxnSp>
+        <p:cxnSp>
+          <p:nvCxnSpPr>
+            <p:cNvPr id="89" name="Straight Connector 88">
+              <a:extLst>
+                <a:ext uri="{FF2B5EF4-FFF2-40B4-BE49-F238E27FC236}">
+                  <a16:creationId xmlns:a16="http://schemas.microsoft.com/office/drawing/2014/main" id="{7B18F31B-C292-4F31-8889-91B8DB97E0F4}"/>
+                </a:ext>
+              </a:extLst>
+            </p:cNvPr>
+            <p:cNvCxnSpPr>
+              <a:cxnSpLocks/>
+              <a:stCxn id="17" idx="2"/>
+              <a:endCxn id="97" idx="0"/>
+            </p:cNvCxnSpPr>
+            <p:nvPr/>
+          </p:nvCxnSpPr>
+          <p:spPr>
+            <a:xfrm>
+              <a:off x="8014524" y="5300194"/>
+              <a:ext cx="0" cy="296745"/>
+            </a:xfrm>
+            <a:prstGeom prst="line">
+              <a:avLst/>
+            </a:prstGeom>
+          </p:spPr>
+          <p:style>
+            <a:lnRef idx="1">
+              <a:schemeClr val="accent1"/>
+            </a:lnRef>
+            <a:fillRef idx="0">
+              <a:schemeClr val="accent1"/>
+            </a:fillRef>
+            <a:effectRef idx="0">
+              <a:schemeClr val="accent1"/>
+            </a:effectRef>
+            <a:fontRef idx="minor">
+              <a:schemeClr val="tx1"/>
+            </a:fontRef>
+          </p:style>
+        </p:cxnSp>
+        <p:cxnSp>
+          <p:nvCxnSpPr>
+            <p:cNvPr id="91" name="Straight Connector 90">
+              <a:extLst>
+                <a:ext uri="{FF2B5EF4-FFF2-40B4-BE49-F238E27FC236}">
+                  <a16:creationId xmlns:a16="http://schemas.microsoft.com/office/drawing/2014/main" id="{019F4F04-D79E-4923-AD33-474BB0835C0B}"/>
+                </a:ext>
+              </a:extLst>
+            </p:cNvPr>
+            <p:cNvCxnSpPr>
+              <a:cxnSpLocks/>
+              <a:stCxn id="97" idx="3"/>
+              <a:endCxn id="21" idx="1"/>
+            </p:cNvCxnSpPr>
+            <p:nvPr/>
+          </p:nvCxnSpPr>
+          <p:spPr>
+            <a:xfrm flipV="1">
+              <a:off x="8935363" y="6047432"/>
+              <a:ext cx="280223" cy="6707"/>
+            </a:xfrm>
+            <a:prstGeom prst="line">
+              <a:avLst/>
+            </a:prstGeom>
+          </p:spPr>
+          <p:style>
+            <a:lnRef idx="1">
+              <a:schemeClr val="accent1"/>
+            </a:lnRef>
+            <a:fillRef idx="0">
+              <a:schemeClr val="accent1"/>
+            </a:fillRef>
+            <a:effectRef idx="0">
+              <a:schemeClr val="accent1"/>
+            </a:effectRef>
+            <a:fontRef idx="minor">
+              <a:schemeClr val="tx1"/>
+            </a:fontRef>
+          </p:style>
+        </p:cxnSp>
+        <p:sp>
+          <p:nvSpPr>
+            <p:cNvPr id="97" name="Diamond 96">
+              <a:extLst>
+                <a:ext uri="{FF2B5EF4-FFF2-40B4-BE49-F238E27FC236}">
+                  <a16:creationId xmlns:a16="http://schemas.microsoft.com/office/drawing/2014/main" id="{FA131C8C-7A63-4A64-A805-18E70B31D425}"/>
+                </a:ext>
+              </a:extLst>
+            </p:cNvPr>
+            <p:cNvSpPr/>
+            <p:nvPr/>
+          </p:nvSpPr>
+          <p:spPr>
+            <a:xfrm>
+              <a:off x="7093684" y="5596939"/>
+              <a:ext cx="1841679" cy="914400"/>
+            </a:xfrm>
+            <a:prstGeom prst="diamond">
+              <a:avLst/>
+            </a:prstGeom>
+          </p:spPr>
+          <p:style>
+            <a:lnRef idx="2">
+              <a:schemeClr val="accent6"/>
+            </a:lnRef>
+            <a:fillRef idx="1">
+              <a:schemeClr val="lt1"/>
+            </a:fillRef>
+            <a:effectRef idx="0">
+              <a:schemeClr val="accent6"/>
+            </a:effectRef>
+            <a:fontRef idx="minor">
+              <a:schemeClr val="dk1"/>
+            </a:fontRef>
+          </p:style>
+          <p:txBody>
+            <a:bodyPr rtlCol="0" anchor="ctr"/>
+            <a:lstStyle/>
+            <a:p>
+              <a:pPr algn="ctr"/>
+              <a:r>
+                <a:rPr lang="en-US" sz="1200" dirty="0" err="1"/>
+                <a:t>Alokasi</a:t>
+              </a:r>
+              <a:r>
+                <a:rPr lang="en-US" sz="1200" dirty="0"/>
+                <a:t> </a:t>
+              </a:r>
+              <a:r>
+                <a:rPr lang="en-US" sz="1200" dirty="0" err="1"/>
+                <a:t>Kendaraan</a:t>
+              </a:r>
+              <a:endParaRPr lang="en-US" sz="1200" dirty="0"/>
+            </a:p>
+          </p:txBody>
+        </p:sp>
+        <p:cxnSp>
+          <p:nvCxnSpPr>
+            <p:cNvPr id="105" name="Straight Connector 104">
+              <a:extLst>
+                <a:ext uri="{FF2B5EF4-FFF2-40B4-BE49-F238E27FC236}">
+                  <a16:creationId xmlns:a16="http://schemas.microsoft.com/office/drawing/2014/main" id="{8AD42A0F-EFF2-4854-90BB-78D1B35D6031}"/>
+                </a:ext>
+              </a:extLst>
+            </p:cNvPr>
+            <p:cNvCxnSpPr>
+              <a:cxnSpLocks/>
+              <a:stCxn id="17" idx="1"/>
+              <a:endCxn id="23" idx="3"/>
+            </p:cNvCxnSpPr>
+            <p:nvPr/>
+          </p:nvCxnSpPr>
+          <p:spPr>
+            <a:xfrm flipH="1" flipV="1">
+              <a:off x="5970862" y="5057424"/>
+              <a:ext cx="935971" cy="10950"/>
+            </a:xfrm>
+            <a:prstGeom prst="line">
+              <a:avLst/>
+            </a:prstGeom>
+          </p:spPr>
+          <p:style>
+            <a:lnRef idx="1">
+              <a:schemeClr val="accent1"/>
+            </a:lnRef>
+            <a:fillRef idx="0">
+              <a:schemeClr val="accent1"/>
+            </a:fillRef>
+            <a:effectRef idx="0">
+              <a:schemeClr val="accent1"/>
+            </a:effectRef>
+            <a:fontRef idx="minor">
+              <a:schemeClr val="tx1"/>
+            </a:fontRef>
+          </p:style>
+        </p:cxnSp>
+        <p:cxnSp>
+          <p:nvCxnSpPr>
+            <p:cNvPr id="107" name="Straight Connector 106">
+              <a:extLst>
+                <a:ext uri="{FF2B5EF4-FFF2-40B4-BE49-F238E27FC236}">
+                  <a16:creationId xmlns:a16="http://schemas.microsoft.com/office/drawing/2014/main" id="{06BCB15F-37EE-45C5-B716-6997CEFC4B7B}"/>
+                </a:ext>
+              </a:extLst>
+            </p:cNvPr>
+            <p:cNvCxnSpPr>
+              <a:cxnSpLocks/>
+              <a:stCxn id="23" idx="1"/>
+              <a:endCxn id="15" idx="3"/>
+            </p:cNvCxnSpPr>
+            <p:nvPr/>
+          </p:nvCxnSpPr>
+          <p:spPr>
+            <a:xfrm flipH="1">
+              <a:off x="3206838" y="5057424"/>
+              <a:ext cx="922345" cy="11918"/>
+            </a:xfrm>
+            <a:prstGeom prst="line">
+              <a:avLst/>
+            </a:prstGeom>
+          </p:spPr>
+          <p:style>
+            <a:lnRef idx="1">
+              <a:schemeClr val="accent1"/>
+            </a:lnRef>
+            <a:fillRef idx="0">
+              <a:schemeClr val="accent1"/>
+            </a:fillRef>
+            <a:effectRef idx="0">
+              <a:schemeClr val="accent1"/>
+            </a:effectRef>
+            <a:fontRef idx="minor">
+              <a:schemeClr val="tx1"/>
+            </a:fontRef>
+          </p:style>
+        </p:cxnSp>
+        <p:cxnSp>
+          <p:nvCxnSpPr>
+            <p:cNvPr id="112" name="Straight Connector 111">
+              <a:extLst>
+                <a:ext uri="{FF2B5EF4-FFF2-40B4-BE49-F238E27FC236}">
+                  <a16:creationId xmlns:a16="http://schemas.microsoft.com/office/drawing/2014/main" id="{0A363CDB-77F2-45BA-B43B-86DF1415D599}"/>
+                </a:ext>
+              </a:extLst>
+            </p:cNvPr>
+            <p:cNvCxnSpPr>
+              <a:cxnSpLocks/>
+              <a:stCxn id="17" idx="0"/>
+              <a:endCxn id="4" idx="2"/>
+            </p:cNvCxnSpPr>
+            <p:nvPr/>
+          </p:nvCxnSpPr>
+          <p:spPr>
+            <a:xfrm flipH="1" flipV="1">
+              <a:off x="5044226" y="1171977"/>
+              <a:ext cx="2970298" cy="3664577"/>
+            </a:xfrm>
+            <a:prstGeom prst="line">
+              <a:avLst/>
+            </a:prstGeom>
+          </p:spPr>
+          <p:style>
+            <a:lnRef idx="1">
+              <a:schemeClr val="accent1"/>
+            </a:lnRef>
+            <a:fillRef idx="0">
+              <a:schemeClr val="accent1"/>
+            </a:fillRef>
+            <a:effectRef idx="0">
+              <a:schemeClr val="accent1"/>
+            </a:effectRef>
+            <a:fontRef idx="minor">
+              <a:schemeClr val="tx1"/>
+            </a:fontRef>
+          </p:style>
+        </p:cxnSp>
+        <p:cxnSp>
+          <p:nvCxnSpPr>
+            <p:cNvPr id="114" name="Straight Connector 113">
+              <a:extLst>
+                <a:ext uri="{FF2B5EF4-FFF2-40B4-BE49-F238E27FC236}">
+                  <a16:creationId xmlns:a16="http://schemas.microsoft.com/office/drawing/2014/main" id="{C0A2F0C3-1A6D-4FE4-BB67-EC63F65C2784}"/>
+                </a:ext>
+              </a:extLst>
+            </p:cNvPr>
+            <p:cNvCxnSpPr>
+              <a:cxnSpLocks/>
+              <a:stCxn id="17" idx="0"/>
+              <a:endCxn id="6" idx="2"/>
+            </p:cNvCxnSpPr>
+            <p:nvPr/>
+          </p:nvCxnSpPr>
+          <p:spPr>
+            <a:xfrm flipH="1" flipV="1">
+              <a:off x="5044225" y="2543577"/>
+              <a:ext cx="2970299" cy="2292977"/>
+            </a:xfrm>
+            <a:prstGeom prst="line">
+              <a:avLst/>
+            </a:prstGeom>
+          </p:spPr>
+          <p:style>
+            <a:lnRef idx="1">
+              <a:schemeClr val="accent1"/>
+            </a:lnRef>
+            <a:fillRef idx="0">
+              <a:schemeClr val="accent1"/>
+            </a:fillRef>
+            <a:effectRef idx="0">
+              <a:schemeClr val="accent1"/>
+            </a:effectRef>
+            <a:fontRef idx="minor">
+              <a:schemeClr val="tx1"/>
+            </a:fontRef>
+          </p:style>
+        </p:cxnSp>
+        <p:cxnSp>
+          <p:nvCxnSpPr>
+            <p:cNvPr id="154" name="Straight Connector 153">
+              <a:extLst>
+                <a:ext uri="{FF2B5EF4-FFF2-40B4-BE49-F238E27FC236}">
+                  <a16:creationId xmlns:a16="http://schemas.microsoft.com/office/drawing/2014/main" id="{9DCF6BAA-6796-4780-B273-1B90CE5CB93E}"/>
+                </a:ext>
+              </a:extLst>
+            </p:cNvPr>
+            <p:cNvCxnSpPr>
+              <a:stCxn id="17" idx="0"/>
+              <a:endCxn id="10" idx="3"/>
+            </p:cNvCxnSpPr>
+            <p:nvPr/>
+          </p:nvCxnSpPr>
+          <p:spPr>
+            <a:xfrm flipH="1" flipV="1">
+              <a:off x="4123385" y="2776630"/>
+              <a:ext cx="3891139" cy="2059924"/>
+            </a:xfrm>
+            <a:prstGeom prst="line">
+              <a:avLst/>
+            </a:prstGeom>
+          </p:spPr>
+          <p:style>
+            <a:lnRef idx="1">
+              <a:schemeClr val="accent1"/>
+            </a:lnRef>
+            <a:fillRef idx="0">
+              <a:schemeClr val="accent1"/>
+            </a:fillRef>
+            <a:effectRef idx="0">
+              <a:schemeClr val="accent1"/>
+            </a:effectRef>
+            <a:fontRef idx="minor">
+              <a:schemeClr val="tx1"/>
+            </a:fontRef>
+          </p:style>
+        </p:cxnSp>
+        <p:cxnSp>
+          <p:nvCxnSpPr>
+            <p:cNvPr id="156" name="Straight Connector 155">
+              <a:extLst>
+                <a:ext uri="{FF2B5EF4-FFF2-40B4-BE49-F238E27FC236}">
+                  <a16:creationId xmlns:a16="http://schemas.microsoft.com/office/drawing/2014/main" id="{49038BFD-B06E-4F7B-BEAA-A88D234177BC}"/>
+                </a:ext>
+              </a:extLst>
+            </p:cNvPr>
+            <p:cNvCxnSpPr>
+              <a:cxnSpLocks/>
+              <a:stCxn id="17" idx="0"/>
+              <a:endCxn id="8" idx="3"/>
+            </p:cNvCxnSpPr>
+            <p:nvPr/>
+          </p:nvCxnSpPr>
+          <p:spPr>
+            <a:xfrm flipH="1" flipV="1">
+              <a:off x="1916586" y="3210594"/>
+              <a:ext cx="6097938" cy="1625960"/>
+            </a:xfrm>
+            <a:prstGeom prst="line">
+              <a:avLst/>
+            </a:prstGeom>
+          </p:spPr>
+          <p:style>
+            <a:lnRef idx="1">
+              <a:schemeClr val="accent1"/>
+            </a:lnRef>
+            <a:fillRef idx="0">
+              <a:schemeClr val="accent1"/>
+            </a:fillRef>
+            <a:effectRef idx="0">
+              <a:schemeClr val="accent1"/>
+            </a:effectRef>
+            <a:fontRef idx="minor">
+              <a:schemeClr val="tx1"/>
+            </a:fontRef>
+          </p:style>
+        </p:cxnSp>
+      </p:grpSp>
     </p:spTree>
     <p:extLst>
       <p:ext uri="{BB962C8B-B14F-4D97-AF65-F5344CB8AC3E}">

</xml_diff>

<commit_message>
added reference PR and MI.
</commit_message>
<xml_diff>
--- a/Lectures/IF5030 Manajemen Informasi/ER.pptx
+++ b/Lectures/IF5030 Manajemen Informasi/ER.pptx
@@ -105,6 +105,11 @@
       </a:defRPr>
     </a:lvl9pPr>
   </p:defaultTextStyle>
+  <p:extLst>
+    <p:ext uri="{EFAFB233-063F-42B5-8137-9DF3F51BA10A}">
+      <p15:sldGuideLst xmlns:p15="http://schemas.microsoft.com/office/powerpoint/2012/main"/>
+    </p:ext>
+  </p:extLst>
 </p:presentation>
 </file>
 
@@ -255,7 +260,7 @@
           <a:p>
             <a:fld id="{41E7C1CA-F9CA-4529-B41D-866EF4B9FE5B}" type="datetimeFigureOut">
               <a:rPr lang="en-US" smtClean="0"/>
-              <a:t>9/29/2020</a:t>
+              <a:t>10/1/2020</a:t>
             </a:fld>
             <a:endParaRPr lang="en-US"/>
           </a:p>
@@ -453,7 +458,7 @@
           <a:p>
             <a:fld id="{41E7C1CA-F9CA-4529-B41D-866EF4B9FE5B}" type="datetimeFigureOut">
               <a:rPr lang="en-US" smtClean="0"/>
-              <a:t>9/29/2020</a:t>
+              <a:t>10/1/2020</a:t>
             </a:fld>
             <a:endParaRPr lang="en-US"/>
           </a:p>
@@ -661,7 +666,7 @@
           <a:p>
             <a:fld id="{41E7C1CA-F9CA-4529-B41D-866EF4B9FE5B}" type="datetimeFigureOut">
               <a:rPr lang="en-US" smtClean="0"/>
-              <a:t>9/29/2020</a:t>
+              <a:t>10/1/2020</a:t>
             </a:fld>
             <a:endParaRPr lang="en-US"/>
           </a:p>
@@ -859,7 +864,7 @@
           <a:p>
             <a:fld id="{41E7C1CA-F9CA-4529-B41D-866EF4B9FE5B}" type="datetimeFigureOut">
               <a:rPr lang="en-US" smtClean="0"/>
-              <a:t>9/29/2020</a:t>
+              <a:t>10/1/2020</a:t>
             </a:fld>
             <a:endParaRPr lang="en-US"/>
           </a:p>
@@ -1134,7 +1139,7 @@
           <a:p>
             <a:fld id="{41E7C1CA-F9CA-4529-B41D-866EF4B9FE5B}" type="datetimeFigureOut">
               <a:rPr lang="en-US" smtClean="0"/>
-              <a:t>9/29/2020</a:t>
+              <a:t>10/1/2020</a:t>
             </a:fld>
             <a:endParaRPr lang="en-US"/>
           </a:p>
@@ -1399,7 +1404,7 @@
           <a:p>
             <a:fld id="{41E7C1CA-F9CA-4529-B41D-866EF4B9FE5B}" type="datetimeFigureOut">
               <a:rPr lang="en-US" smtClean="0"/>
-              <a:t>9/29/2020</a:t>
+              <a:t>10/1/2020</a:t>
             </a:fld>
             <a:endParaRPr lang="en-US"/>
           </a:p>
@@ -1811,7 +1816,7 @@
           <a:p>
             <a:fld id="{41E7C1CA-F9CA-4529-B41D-866EF4B9FE5B}" type="datetimeFigureOut">
               <a:rPr lang="en-US" smtClean="0"/>
-              <a:t>9/29/2020</a:t>
+              <a:t>10/1/2020</a:t>
             </a:fld>
             <a:endParaRPr lang="en-US"/>
           </a:p>
@@ -1952,7 +1957,7 @@
           <a:p>
             <a:fld id="{41E7C1CA-F9CA-4529-B41D-866EF4B9FE5B}" type="datetimeFigureOut">
               <a:rPr lang="en-US" smtClean="0"/>
-              <a:t>9/29/2020</a:t>
+              <a:t>10/1/2020</a:t>
             </a:fld>
             <a:endParaRPr lang="en-US"/>
           </a:p>
@@ -2065,7 +2070,7 @@
           <a:p>
             <a:fld id="{41E7C1CA-F9CA-4529-B41D-866EF4B9FE5B}" type="datetimeFigureOut">
               <a:rPr lang="en-US" smtClean="0"/>
-              <a:t>9/29/2020</a:t>
+              <a:t>10/1/2020</a:t>
             </a:fld>
             <a:endParaRPr lang="en-US"/>
           </a:p>
@@ -2376,7 +2381,7 @@
           <a:p>
             <a:fld id="{41E7C1CA-F9CA-4529-B41D-866EF4B9FE5B}" type="datetimeFigureOut">
               <a:rPr lang="en-US" smtClean="0"/>
-              <a:t>9/29/2020</a:t>
+              <a:t>10/1/2020</a:t>
             </a:fld>
             <a:endParaRPr lang="en-US"/>
           </a:p>
@@ -2664,7 +2669,7 @@
           <a:p>
             <a:fld id="{41E7C1CA-F9CA-4529-B41D-866EF4B9FE5B}" type="datetimeFigureOut">
               <a:rPr lang="en-US" smtClean="0"/>
-              <a:t>9/29/2020</a:t>
+              <a:t>10/1/2020</a:t>
             </a:fld>
             <a:endParaRPr lang="en-US"/>
           </a:p>
@@ -2905,7 +2910,7 @@
           <a:p>
             <a:fld id="{41E7C1CA-F9CA-4529-B41D-866EF4B9FE5B}" type="datetimeFigureOut">
               <a:rPr lang="en-US" smtClean="0"/>
-              <a:t>9/29/2020</a:t>
+              <a:t>10/1/2020</a:t>
             </a:fld>
             <a:endParaRPr lang="en-US"/>
           </a:p>
@@ -3404,10 +3409,10 @@
       </p:grpSpPr>
       <p:grpSp>
         <p:nvGrpSpPr>
-          <p:cNvPr id="192" name="Group 191">
-            <a:extLst>
-              <a:ext uri="{FF2B5EF4-FFF2-40B4-BE49-F238E27FC236}">
-                <a16:creationId xmlns:a16="http://schemas.microsoft.com/office/drawing/2014/main" id="{80D4214C-503A-49F8-91C1-2183AFB171DF}"/>
+          <p:cNvPr id="45" name="Group 44">
+            <a:extLst>
+              <a:ext uri="{FF2B5EF4-FFF2-40B4-BE49-F238E27FC236}">
+                <a16:creationId xmlns:a16="http://schemas.microsoft.com/office/drawing/2014/main" id="{E7E2B5DF-A88C-4E3D-93DB-2470E6824D98}"/>
               </a:ext>
             </a:extLst>
           </p:cNvPr>
@@ -3416,10 +3421,10 @@
         </p:nvGrpSpPr>
         <p:grpSpPr>
           <a:xfrm>
-            <a:off x="74907" y="257577"/>
-            <a:ext cx="11449598" cy="6253762"/>
-            <a:chOff x="74907" y="257577"/>
-            <a:chExt cx="11449598" cy="6253762"/>
+            <a:off x="74907" y="283335"/>
+            <a:ext cx="11449434" cy="6253762"/>
+            <a:chOff x="74907" y="283335"/>
+            <a:chExt cx="11449434" cy="6253762"/>
           </a:xfrm>
         </p:grpSpPr>
         <p:sp>
@@ -3436,7 +3441,7 @@
           </p:nvSpPr>
           <p:spPr>
             <a:xfrm>
-              <a:off x="4123386" y="257577"/>
+              <a:off x="4123386" y="283335"/>
               <a:ext cx="1841679" cy="914400"/>
             </a:xfrm>
             <a:prstGeom prst="diamond">
@@ -3464,17 +3469,12 @@
               <a:pPr algn="ctr"/>
               <a:r>
                 <a:rPr lang="en-US" sz="1200" dirty="0" err="1"/>
-                <a:t>Jual</a:t>
+                <a:t>Penjualan</a:t>
               </a:r>
               <a:r>
                 <a:rPr lang="en-US" sz="1200" dirty="0"/>
-                <a:t> </a:t>
+                <a:t> Barang</a:t>
               </a:r>
-              <a:r>
-                <a:rPr lang="en-US" sz="1200" dirty="0" err="1"/>
-                <a:t>Barang</a:t>
-              </a:r>
-              <a:endParaRPr lang="en-US" sz="1200" dirty="0"/>
             </a:p>
           </p:txBody>
         </p:sp>
@@ -3492,7 +3492,7 @@
           </p:nvSpPr>
           <p:spPr>
             <a:xfrm>
-              <a:off x="4123385" y="1629177"/>
+              <a:off x="4123385" y="1654935"/>
               <a:ext cx="1841679" cy="914400"/>
             </a:xfrm>
             <a:prstGeom prst="diamond">
@@ -3520,17 +3520,12 @@
               <a:pPr algn="ctr"/>
               <a:r>
                 <a:rPr lang="en-US" sz="1200" dirty="0" err="1"/>
-                <a:t>Beli</a:t>
+                <a:t>Pembelian</a:t>
               </a:r>
               <a:r>
                 <a:rPr lang="en-US" sz="1200" dirty="0"/>
-                <a:t> </a:t>
+                <a:t> Barang</a:t>
               </a:r>
-              <a:r>
-                <a:rPr lang="en-US" sz="1200" dirty="0" err="1"/>
-                <a:t>Barang</a:t>
-              </a:r>
-              <a:endParaRPr lang="en-US" sz="1200" dirty="0"/>
             </a:p>
           </p:txBody>
         </p:sp>
@@ -3548,7 +3543,7 @@
           </p:nvSpPr>
           <p:spPr>
             <a:xfrm>
-              <a:off x="74907" y="2753394"/>
+              <a:off x="74907" y="2779152"/>
               <a:ext cx="1841679" cy="914400"/>
             </a:xfrm>
             <a:prstGeom prst="diamond">
@@ -3604,7 +3599,7 @@
           </p:nvSpPr>
           <p:spPr>
             <a:xfrm>
-              <a:off x="2281706" y="2319430"/>
+              <a:off x="2281706" y="2345188"/>
               <a:ext cx="1841679" cy="914400"/>
             </a:xfrm>
             <a:prstGeom prst="diamond">
@@ -3660,7 +3655,7 @@
           </p:nvSpPr>
           <p:spPr>
             <a:xfrm>
-              <a:off x="991456" y="1171977"/>
+              <a:off x="991456" y="1197735"/>
               <a:ext cx="2215382" cy="463640"/>
             </a:xfrm>
             <a:prstGeom prst="rect">
@@ -3708,7 +3703,7 @@
           </p:nvSpPr>
           <p:spPr>
             <a:xfrm>
-              <a:off x="8014524" y="1171977"/>
+              <a:off x="8014524" y="1197735"/>
               <a:ext cx="2215382" cy="463640"/>
             </a:xfrm>
             <a:prstGeom prst="rect">
@@ -3755,7 +3750,7 @@
           </p:nvSpPr>
           <p:spPr>
             <a:xfrm>
-              <a:off x="991456" y="4837522"/>
+              <a:off x="991456" y="4863280"/>
               <a:ext cx="2215382" cy="463640"/>
             </a:xfrm>
             <a:prstGeom prst="rect">
@@ -3802,7 +3797,7 @@
           </p:nvSpPr>
           <p:spPr>
             <a:xfrm>
-              <a:off x="6906833" y="4836554"/>
+              <a:off x="6906833" y="4862312"/>
               <a:ext cx="2215382" cy="463640"/>
             </a:xfrm>
             <a:prstGeom prst="rect">
@@ -3850,7 +3845,7 @@
           </p:nvSpPr>
           <p:spPr>
             <a:xfrm>
-              <a:off x="9309123" y="4810796"/>
+              <a:off x="9308959" y="4862312"/>
               <a:ext cx="2215382" cy="463640"/>
             </a:xfrm>
             <a:prstGeom prst="rect">
@@ -3898,7 +3893,7 @@
           </p:nvSpPr>
           <p:spPr>
             <a:xfrm>
-              <a:off x="9215586" y="5815612"/>
+              <a:off x="9215586" y="5841370"/>
               <a:ext cx="2215382" cy="463640"/>
             </a:xfrm>
             <a:prstGeom prst="rect">
@@ -3946,7 +3941,7 @@
           </p:nvSpPr>
           <p:spPr>
             <a:xfrm>
-              <a:off x="4129183" y="4600224"/>
+              <a:off x="4129183" y="4625982"/>
               <a:ext cx="1841679" cy="914400"/>
             </a:xfrm>
             <a:prstGeom prst="diamond">
@@ -3997,7 +3992,7 @@
           </p:nvSpPr>
           <p:spPr>
             <a:xfrm>
-              <a:off x="7093684" y="2318464"/>
+              <a:off x="7093684" y="2344222"/>
               <a:ext cx="1841679" cy="914400"/>
             </a:xfrm>
             <a:prstGeom prst="diamond">
@@ -4025,7 +4020,7 @@
               <a:pPr algn="ctr"/>
               <a:r>
                 <a:rPr lang="en-US" sz="1200" dirty="0" err="1"/>
-                <a:t>Beli</a:t>
+                <a:t>Pembelian</a:t>
               </a:r>
               <a:r>
                 <a:rPr lang="en-US" sz="1200" dirty="0"/>
@@ -4053,7 +4048,7 @@
           </p:nvSpPr>
           <p:spPr>
             <a:xfrm>
-              <a:off x="9495809" y="2324904"/>
+              <a:off x="9495809" y="2350662"/>
               <a:ext cx="1841679" cy="914400"/>
             </a:xfrm>
             <a:prstGeom prst="diamond">
@@ -4081,7 +4076,7 @@
               <a:pPr algn="ctr"/>
               <a:r>
                 <a:rPr lang="en-US" sz="1200" dirty="0" err="1"/>
-                <a:t>Jual</a:t>
+                <a:t>Penjualan</a:t>
               </a:r>
               <a:r>
                 <a:rPr lang="en-US" sz="1200" dirty="0"/>
@@ -4112,7 +4107,7 @@
           </p:nvCxnSpPr>
           <p:spPr>
             <a:xfrm flipV="1">
-              <a:off x="995747" y="1635617"/>
+              <a:off x="995747" y="1661375"/>
               <a:ext cx="1103400" cy="1117777"/>
             </a:xfrm>
             <a:prstGeom prst="line">
@@ -4152,7 +4147,7 @@
           </p:nvCxnSpPr>
           <p:spPr>
             <a:xfrm flipH="1" flipV="1">
-              <a:off x="2099147" y="1635617"/>
+              <a:off x="2099147" y="1661375"/>
               <a:ext cx="1103399" cy="683813"/>
             </a:xfrm>
             <a:prstGeom prst="line">
@@ -4192,7 +4187,7 @@
           </p:nvCxnSpPr>
           <p:spPr>
             <a:xfrm flipV="1">
-              <a:off x="2099147" y="3233830"/>
+              <a:off x="2099147" y="3259588"/>
               <a:ext cx="1103399" cy="1603692"/>
             </a:xfrm>
             <a:prstGeom prst="line">
@@ -4232,7 +4227,7 @@
           </p:nvCxnSpPr>
           <p:spPr>
             <a:xfrm>
-              <a:off x="995747" y="3667794"/>
+              <a:off x="995747" y="3693552"/>
               <a:ext cx="1103400" cy="1169728"/>
             </a:xfrm>
             <a:prstGeom prst="line">
@@ -4272,7 +4267,7 @@
           </p:nvCxnSpPr>
           <p:spPr>
             <a:xfrm flipV="1">
-              <a:off x="3206838" y="714777"/>
+              <a:off x="3206838" y="740535"/>
               <a:ext cx="916548" cy="689020"/>
             </a:xfrm>
             <a:prstGeom prst="line">
@@ -4312,7 +4307,7 @@
           </p:nvCxnSpPr>
           <p:spPr>
             <a:xfrm>
-              <a:off x="3206838" y="1403797"/>
+              <a:off x="3206838" y="1429555"/>
               <a:ext cx="916547" cy="682580"/>
             </a:xfrm>
             <a:prstGeom prst="line">
@@ -4352,7 +4347,7 @@
           </p:nvCxnSpPr>
           <p:spPr>
             <a:xfrm flipH="1" flipV="1">
-              <a:off x="5965065" y="714777"/>
+              <a:off x="5965065" y="740535"/>
               <a:ext cx="2049459" cy="689020"/>
             </a:xfrm>
             <a:prstGeom prst="line">
@@ -4392,7 +4387,7 @@
           </p:nvCxnSpPr>
           <p:spPr>
             <a:xfrm flipV="1">
-              <a:off x="5965064" y="1403797"/>
+              <a:off x="5965064" y="1429555"/>
               <a:ext cx="2049460" cy="682580"/>
             </a:xfrm>
             <a:prstGeom prst="line">
@@ -4432,7 +4427,7 @@
           </p:nvCxnSpPr>
           <p:spPr>
             <a:xfrm flipV="1">
-              <a:off x="8014524" y="1635617"/>
+              <a:off x="8014524" y="1661375"/>
               <a:ext cx="1107691" cy="682847"/>
             </a:xfrm>
             <a:prstGeom prst="line">
@@ -4472,7 +4467,7 @@
           </p:nvCxnSpPr>
           <p:spPr>
             <a:xfrm flipH="1" flipV="1">
-              <a:off x="9122215" y="1635617"/>
+              <a:off x="9122215" y="1661375"/>
               <a:ext cx="1294434" cy="689287"/>
             </a:xfrm>
             <a:prstGeom prst="line">
@@ -4512,7 +4507,7 @@
           </p:nvCxnSpPr>
           <p:spPr>
             <a:xfrm flipV="1">
-              <a:off x="8014524" y="3239304"/>
+              <a:off x="8014524" y="3265062"/>
               <a:ext cx="2402125" cy="1597250"/>
             </a:xfrm>
             <a:prstGeom prst="line">
@@ -4552,7 +4547,7 @@
           </p:nvCxnSpPr>
           <p:spPr>
             <a:xfrm flipV="1">
-              <a:off x="8014524" y="3232864"/>
+              <a:off x="8014524" y="3258622"/>
               <a:ext cx="0" cy="1603690"/>
             </a:xfrm>
             <a:prstGeom prst="line">
@@ -4592,8 +4587,8 @@
           </p:nvCxnSpPr>
           <p:spPr>
             <a:xfrm flipH="1" flipV="1">
-              <a:off x="10416649" y="3239304"/>
-              <a:ext cx="165" cy="1571492"/>
+              <a:off x="10416649" y="3265062"/>
+              <a:ext cx="1" cy="1597250"/>
             </a:xfrm>
             <a:prstGeom prst="line">
               <a:avLst/>
@@ -4632,8 +4627,8 @@
           </p:nvCxnSpPr>
           <p:spPr>
             <a:xfrm flipH="1" flipV="1">
-              <a:off x="8014524" y="3232864"/>
-              <a:ext cx="2402290" cy="1577932"/>
+              <a:off x="8014524" y="3258622"/>
+              <a:ext cx="2402126" cy="1603690"/>
             </a:xfrm>
             <a:prstGeom prst="line">
               <a:avLst/>
@@ -4672,7 +4667,7 @@
           </p:nvCxnSpPr>
           <p:spPr>
             <a:xfrm>
-              <a:off x="8014524" y="5300194"/>
+              <a:off x="8014524" y="5325952"/>
               <a:ext cx="0" cy="296745"/>
             </a:xfrm>
             <a:prstGeom prst="line">
@@ -4712,7 +4707,7 @@
           </p:nvCxnSpPr>
           <p:spPr>
             <a:xfrm flipV="1">
-              <a:off x="8935363" y="6047432"/>
+              <a:off x="8935363" y="6073190"/>
               <a:ext cx="280223" cy="6707"/>
             </a:xfrm>
             <a:prstGeom prst="line">
@@ -4748,7 +4743,7 @@
           </p:nvSpPr>
           <p:spPr>
             <a:xfrm>
-              <a:off x="7093684" y="5596939"/>
+              <a:off x="7093684" y="5622697"/>
               <a:ext cx="1841679" cy="914400"/>
             </a:xfrm>
             <a:prstGeom prst="diamond">
@@ -4808,7 +4803,7 @@
           </p:nvCxnSpPr>
           <p:spPr>
             <a:xfrm flipH="1" flipV="1">
-              <a:off x="5970862" y="5057424"/>
+              <a:off x="5970862" y="5083182"/>
               <a:ext cx="935971" cy="10950"/>
             </a:xfrm>
             <a:prstGeom prst="line">
@@ -4848,7 +4843,7 @@
           </p:nvCxnSpPr>
           <p:spPr>
             <a:xfrm flipH="1">
-              <a:off x="3206838" y="5057424"/>
+              <a:off x="3206838" y="5083182"/>
               <a:ext cx="922345" cy="11918"/>
             </a:xfrm>
             <a:prstGeom prst="line">
@@ -4888,7 +4883,7 @@
           </p:nvCxnSpPr>
           <p:spPr>
             <a:xfrm flipH="1" flipV="1">
-              <a:off x="5044226" y="1171977"/>
+              <a:off x="5044226" y="1197735"/>
               <a:ext cx="2970298" cy="3664577"/>
             </a:xfrm>
             <a:prstGeom prst="line">
@@ -4928,7 +4923,7 @@
           </p:nvCxnSpPr>
           <p:spPr>
             <a:xfrm flipH="1" flipV="1">
-              <a:off x="5044225" y="2543577"/>
+              <a:off x="5044225" y="2569335"/>
               <a:ext cx="2970299" cy="2292977"/>
             </a:xfrm>
             <a:prstGeom prst="line">
@@ -4967,7 +4962,7 @@
           </p:nvCxnSpPr>
           <p:spPr>
             <a:xfrm flipH="1" flipV="1">
-              <a:off x="4123385" y="2776630"/>
+              <a:off x="4123385" y="2802388"/>
               <a:ext cx="3891139" cy="2059924"/>
             </a:xfrm>
             <a:prstGeom prst="line">
@@ -5007,7 +5002,7 @@
           </p:nvCxnSpPr>
           <p:spPr>
             <a:xfrm flipH="1" flipV="1">
-              <a:off x="1916586" y="3210594"/>
+              <a:off x="1916586" y="3236352"/>
               <a:ext cx="6097938" cy="1625960"/>
             </a:xfrm>
             <a:prstGeom prst="line">
@@ -5029,6 +5024,671 @@
             </a:fontRef>
           </p:style>
         </p:cxnSp>
+        <p:sp>
+          <p:nvSpPr>
+            <p:cNvPr id="2" name="TextBox 1">
+              <a:extLst>
+                <a:ext uri="{FF2B5EF4-FFF2-40B4-BE49-F238E27FC236}">
+                  <a16:creationId xmlns:a16="http://schemas.microsoft.com/office/drawing/2014/main" id="{CA507578-9D93-40DA-B6E2-E7B1F4FDA8C0}"/>
+                </a:ext>
+              </a:extLst>
+            </p:cNvPr>
+            <p:cNvSpPr txBox="1"/>
+            <p:nvPr/>
+          </p:nvSpPr>
+          <p:spPr>
+            <a:xfrm>
+              <a:off x="3286152" y="658574"/>
+              <a:ext cx="359394" cy="369332"/>
+            </a:xfrm>
+            <a:prstGeom prst="rect">
+              <a:avLst/>
+            </a:prstGeom>
+            <a:noFill/>
+          </p:spPr>
+          <p:txBody>
+            <a:bodyPr wrap="none" rtlCol="0">
+              <a:spAutoFit/>
+            </a:bodyPr>
+            <a:lstStyle/>
+            <a:p>
+              <a:r>
+                <a:rPr lang="en-US" dirty="0"/>
+                <a:t> n</a:t>
+              </a:r>
+            </a:p>
+          </p:txBody>
+        </p:sp>
+        <p:sp>
+          <p:nvSpPr>
+            <p:cNvPr id="3" name="TextBox 2">
+              <a:extLst>
+                <a:ext uri="{FF2B5EF4-FFF2-40B4-BE49-F238E27FC236}">
+                  <a16:creationId xmlns:a16="http://schemas.microsoft.com/office/drawing/2014/main" id="{0B74224B-3633-4D0C-9D15-D78E7833978B}"/>
+                </a:ext>
+              </a:extLst>
+            </p:cNvPr>
+            <p:cNvSpPr txBox="1"/>
+            <p:nvPr/>
+          </p:nvSpPr>
+          <p:spPr>
+            <a:xfrm>
+              <a:off x="7108710" y="813595"/>
+              <a:ext cx="359394" cy="369332"/>
+            </a:xfrm>
+            <a:prstGeom prst="rect">
+              <a:avLst/>
+            </a:prstGeom>
+            <a:noFill/>
+          </p:spPr>
+          <p:txBody>
+            <a:bodyPr wrap="none" rtlCol="0">
+              <a:spAutoFit/>
+            </a:bodyPr>
+            <a:lstStyle/>
+            <a:p>
+              <a:r>
+                <a:rPr lang="en-US" dirty="0"/>
+                <a:t> n</a:t>
+              </a:r>
+            </a:p>
+          </p:txBody>
+        </p:sp>
+        <p:sp>
+          <p:nvSpPr>
+            <p:cNvPr id="5" name="TextBox 4">
+              <a:extLst>
+                <a:ext uri="{FF2B5EF4-FFF2-40B4-BE49-F238E27FC236}">
+                  <a16:creationId xmlns:a16="http://schemas.microsoft.com/office/drawing/2014/main" id="{3B7EBEFA-9900-433F-8EEA-CA0EB3B6A1A5}"/>
+                </a:ext>
+              </a:extLst>
+            </p:cNvPr>
+            <p:cNvSpPr txBox="1"/>
+            <p:nvPr/>
+          </p:nvSpPr>
+          <p:spPr>
+            <a:xfrm>
+              <a:off x="3696061" y="1528634"/>
+              <a:ext cx="306494" cy="369332"/>
+            </a:xfrm>
+            <a:prstGeom prst="rect">
+              <a:avLst/>
+            </a:prstGeom>
+            <a:noFill/>
+          </p:spPr>
+          <p:txBody>
+            <a:bodyPr wrap="none" rtlCol="0">
+              <a:spAutoFit/>
+            </a:bodyPr>
+            <a:lstStyle/>
+            <a:p>
+              <a:r>
+                <a:rPr lang="en-US" dirty="0"/>
+                <a:t>n</a:t>
+              </a:r>
+            </a:p>
+          </p:txBody>
+        </p:sp>
+        <p:sp>
+          <p:nvSpPr>
+            <p:cNvPr id="7" name="TextBox 6">
+              <a:extLst>
+                <a:ext uri="{FF2B5EF4-FFF2-40B4-BE49-F238E27FC236}">
+                  <a16:creationId xmlns:a16="http://schemas.microsoft.com/office/drawing/2014/main" id="{61E8B482-27B2-41B0-8847-87C6D62545C9}"/>
+                </a:ext>
+              </a:extLst>
+            </p:cNvPr>
+            <p:cNvSpPr txBox="1"/>
+            <p:nvPr/>
+          </p:nvSpPr>
+          <p:spPr>
+            <a:xfrm>
+              <a:off x="8395772" y="4449529"/>
+              <a:ext cx="359394" cy="369332"/>
+            </a:xfrm>
+            <a:prstGeom prst="rect">
+              <a:avLst/>
+            </a:prstGeom>
+            <a:noFill/>
+          </p:spPr>
+          <p:txBody>
+            <a:bodyPr wrap="none" rtlCol="0">
+              <a:spAutoFit/>
+            </a:bodyPr>
+            <a:lstStyle/>
+            <a:p>
+              <a:r>
+                <a:rPr lang="en-US" dirty="0"/>
+                <a:t> n</a:t>
+              </a:r>
+            </a:p>
+          </p:txBody>
+        </p:sp>
+        <p:sp>
+          <p:nvSpPr>
+            <p:cNvPr id="9" name="TextBox 8">
+              <a:extLst>
+                <a:ext uri="{FF2B5EF4-FFF2-40B4-BE49-F238E27FC236}">
+                  <a16:creationId xmlns:a16="http://schemas.microsoft.com/office/drawing/2014/main" id="{F533B3F1-1DC3-4FAC-B38D-B4625FC0DA62}"/>
+                </a:ext>
+              </a:extLst>
+            </p:cNvPr>
+            <p:cNvSpPr txBox="1"/>
+            <p:nvPr/>
+          </p:nvSpPr>
+          <p:spPr>
+            <a:xfrm>
+              <a:off x="5064060" y="1071988"/>
+              <a:ext cx="354584" cy="369332"/>
+            </a:xfrm>
+            <a:prstGeom prst="rect">
+              <a:avLst/>
+            </a:prstGeom>
+            <a:noFill/>
+          </p:spPr>
+          <p:txBody>
+            <a:bodyPr wrap="none" rtlCol="0">
+              <a:spAutoFit/>
+            </a:bodyPr>
+            <a:lstStyle/>
+            <a:p>
+              <a:r>
+                <a:rPr lang="en-US" dirty="0"/>
+                <a:t> 1</a:t>
+              </a:r>
+            </a:p>
+          </p:txBody>
+        </p:sp>
+        <p:sp>
+          <p:nvSpPr>
+            <p:cNvPr id="12" name="TextBox 11">
+              <a:extLst>
+                <a:ext uri="{FF2B5EF4-FFF2-40B4-BE49-F238E27FC236}">
+                  <a16:creationId xmlns:a16="http://schemas.microsoft.com/office/drawing/2014/main" id="{18C3A816-9557-4224-9591-76A4512000FB}"/>
+                </a:ext>
+              </a:extLst>
+            </p:cNvPr>
+            <p:cNvSpPr txBox="1"/>
+            <p:nvPr/>
+          </p:nvSpPr>
+          <p:spPr>
+            <a:xfrm>
+              <a:off x="3209684" y="4761839"/>
+              <a:ext cx="301686" cy="369332"/>
+            </a:xfrm>
+            <a:prstGeom prst="rect">
+              <a:avLst/>
+            </a:prstGeom>
+            <a:noFill/>
+          </p:spPr>
+          <p:txBody>
+            <a:bodyPr wrap="none" rtlCol="0">
+              <a:spAutoFit/>
+            </a:bodyPr>
+            <a:lstStyle/>
+            <a:p>
+              <a:r>
+                <a:rPr lang="en-US" dirty="0"/>
+                <a:t>1</a:t>
+              </a:r>
+            </a:p>
+          </p:txBody>
+        </p:sp>
+        <p:sp>
+          <p:nvSpPr>
+            <p:cNvPr id="14" name="TextBox 13">
+              <a:extLst>
+                <a:ext uri="{FF2B5EF4-FFF2-40B4-BE49-F238E27FC236}">
+                  <a16:creationId xmlns:a16="http://schemas.microsoft.com/office/drawing/2014/main" id="{7832F63B-22BA-495F-B1CB-93D9EBD7F7B2}"/>
+                </a:ext>
+              </a:extLst>
+            </p:cNvPr>
+            <p:cNvSpPr txBox="1"/>
+            <p:nvPr/>
+          </p:nvSpPr>
+          <p:spPr>
+            <a:xfrm>
+              <a:off x="1188053" y="1790276"/>
+              <a:ext cx="359394" cy="369332"/>
+            </a:xfrm>
+            <a:prstGeom prst="rect">
+              <a:avLst/>
+            </a:prstGeom>
+            <a:noFill/>
+          </p:spPr>
+          <p:txBody>
+            <a:bodyPr wrap="none" rtlCol="0">
+              <a:spAutoFit/>
+            </a:bodyPr>
+            <a:lstStyle/>
+            <a:p>
+              <a:r>
+                <a:rPr lang="en-US" dirty="0"/>
+                <a:t> n</a:t>
+              </a:r>
+            </a:p>
+          </p:txBody>
+        </p:sp>
+        <p:sp>
+          <p:nvSpPr>
+            <p:cNvPr id="16" name="TextBox 15">
+              <a:extLst>
+                <a:ext uri="{FF2B5EF4-FFF2-40B4-BE49-F238E27FC236}">
+                  <a16:creationId xmlns:a16="http://schemas.microsoft.com/office/drawing/2014/main" id="{64CFFCF3-F042-456E-A0D6-1A8A07D2BA6B}"/>
+                </a:ext>
+              </a:extLst>
+            </p:cNvPr>
+            <p:cNvSpPr txBox="1"/>
+            <p:nvPr/>
+          </p:nvSpPr>
+          <p:spPr>
+            <a:xfrm>
+              <a:off x="1133377" y="4004550"/>
+              <a:ext cx="359394" cy="369332"/>
+            </a:xfrm>
+            <a:prstGeom prst="rect">
+              <a:avLst/>
+            </a:prstGeom>
+            <a:noFill/>
+          </p:spPr>
+          <p:txBody>
+            <a:bodyPr wrap="none" rtlCol="0">
+              <a:spAutoFit/>
+            </a:bodyPr>
+            <a:lstStyle/>
+            <a:p>
+              <a:r>
+                <a:rPr lang="en-US" dirty="0"/>
+                <a:t> n</a:t>
+              </a:r>
+            </a:p>
+          </p:txBody>
+        </p:sp>
+        <p:sp>
+          <p:nvSpPr>
+            <p:cNvPr id="18" name="TextBox 17">
+              <a:extLst>
+                <a:ext uri="{FF2B5EF4-FFF2-40B4-BE49-F238E27FC236}">
+                  <a16:creationId xmlns:a16="http://schemas.microsoft.com/office/drawing/2014/main" id="{72E5697F-4CCE-4D47-A9C6-EB78FEF32F9C}"/>
+                </a:ext>
+              </a:extLst>
+            </p:cNvPr>
+            <p:cNvSpPr txBox="1"/>
+            <p:nvPr/>
+          </p:nvSpPr>
+          <p:spPr>
+            <a:xfrm>
+              <a:off x="2114162" y="1788041"/>
+              <a:ext cx="359394" cy="369332"/>
+            </a:xfrm>
+            <a:prstGeom prst="rect">
+              <a:avLst/>
+            </a:prstGeom>
+            <a:noFill/>
+          </p:spPr>
+          <p:txBody>
+            <a:bodyPr wrap="none" rtlCol="0">
+              <a:spAutoFit/>
+            </a:bodyPr>
+            <a:lstStyle/>
+            <a:p>
+              <a:r>
+                <a:rPr lang="en-US" dirty="0"/>
+                <a:t> n</a:t>
+              </a:r>
+            </a:p>
+          </p:txBody>
+        </p:sp>
+        <p:sp>
+          <p:nvSpPr>
+            <p:cNvPr id="20" name="TextBox 19">
+              <a:extLst>
+                <a:ext uri="{FF2B5EF4-FFF2-40B4-BE49-F238E27FC236}">
+                  <a16:creationId xmlns:a16="http://schemas.microsoft.com/office/drawing/2014/main" id="{2F53C00C-638F-42B1-A22C-4C010AB22734}"/>
+                </a:ext>
+              </a:extLst>
+            </p:cNvPr>
+            <p:cNvSpPr txBox="1"/>
+            <p:nvPr/>
+          </p:nvSpPr>
+          <p:spPr>
+            <a:xfrm>
+              <a:off x="2200090" y="4004550"/>
+              <a:ext cx="359394" cy="369332"/>
+            </a:xfrm>
+            <a:prstGeom prst="rect">
+              <a:avLst/>
+            </a:prstGeom>
+            <a:noFill/>
+          </p:spPr>
+          <p:txBody>
+            <a:bodyPr wrap="square" rtlCol="0">
+              <a:spAutoFit/>
+            </a:bodyPr>
+            <a:lstStyle/>
+            <a:p>
+              <a:r>
+                <a:rPr lang="en-US" dirty="0"/>
+                <a:t> n</a:t>
+              </a:r>
+            </a:p>
+          </p:txBody>
+        </p:sp>
+        <p:sp>
+          <p:nvSpPr>
+            <p:cNvPr id="22" name="TextBox 21">
+              <a:extLst>
+                <a:ext uri="{FF2B5EF4-FFF2-40B4-BE49-F238E27FC236}">
+                  <a16:creationId xmlns:a16="http://schemas.microsoft.com/office/drawing/2014/main" id="{9ECC1EAD-4070-4448-9192-8F0C74C33792}"/>
+                </a:ext>
+              </a:extLst>
+            </p:cNvPr>
+            <p:cNvSpPr txBox="1"/>
+            <p:nvPr/>
+          </p:nvSpPr>
+          <p:spPr>
+            <a:xfrm>
+              <a:off x="6606217" y="4738696"/>
+              <a:ext cx="301686" cy="369332"/>
+            </a:xfrm>
+            <a:prstGeom prst="rect">
+              <a:avLst/>
+            </a:prstGeom>
+            <a:noFill/>
+          </p:spPr>
+          <p:txBody>
+            <a:bodyPr wrap="none" rtlCol="0">
+              <a:spAutoFit/>
+            </a:bodyPr>
+            <a:lstStyle/>
+            <a:p>
+              <a:r>
+                <a:rPr lang="en-US" dirty="0"/>
+                <a:t>1</a:t>
+              </a:r>
+            </a:p>
+          </p:txBody>
+        </p:sp>
+        <p:sp>
+          <p:nvSpPr>
+            <p:cNvPr id="24" name="TextBox 23">
+              <a:extLst>
+                <a:ext uri="{FF2B5EF4-FFF2-40B4-BE49-F238E27FC236}">
+                  <a16:creationId xmlns:a16="http://schemas.microsoft.com/office/drawing/2014/main" id="{A48EFDD7-E3A2-4CA2-86C0-D7838E0A80ED}"/>
+                </a:ext>
+              </a:extLst>
+            </p:cNvPr>
+            <p:cNvSpPr txBox="1"/>
+            <p:nvPr/>
+          </p:nvSpPr>
+          <p:spPr>
+            <a:xfrm>
+              <a:off x="7715847" y="5292788"/>
+              <a:ext cx="301686" cy="369332"/>
+            </a:xfrm>
+            <a:prstGeom prst="rect">
+              <a:avLst/>
+            </a:prstGeom>
+            <a:noFill/>
+          </p:spPr>
+          <p:txBody>
+            <a:bodyPr wrap="none" rtlCol="0">
+              <a:spAutoFit/>
+            </a:bodyPr>
+            <a:lstStyle/>
+            <a:p>
+              <a:r>
+                <a:rPr lang="en-US" dirty="0"/>
+                <a:t>1</a:t>
+              </a:r>
+            </a:p>
+          </p:txBody>
+        </p:sp>
+        <p:sp>
+          <p:nvSpPr>
+            <p:cNvPr id="26" name="TextBox 25">
+              <a:extLst>
+                <a:ext uri="{FF2B5EF4-FFF2-40B4-BE49-F238E27FC236}">
+                  <a16:creationId xmlns:a16="http://schemas.microsoft.com/office/drawing/2014/main" id="{EF7F1810-64D3-4B40-86A5-1578C84054B8}"/>
+                </a:ext>
+              </a:extLst>
+            </p:cNvPr>
+            <p:cNvSpPr txBox="1"/>
+            <p:nvPr/>
+          </p:nvSpPr>
+          <p:spPr>
+            <a:xfrm>
+              <a:off x="8913900" y="6038714"/>
+              <a:ext cx="301686" cy="369332"/>
+            </a:xfrm>
+            <a:prstGeom prst="rect">
+              <a:avLst/>
+            </a:prstGeom>
+            <a:noFill/>
+          </p:spPr>
+          <p:txBody>
+            <a:bodyPr wrap="none" rtlCol="0">
+              <a:spAutoFit/>
+            </a:bodyPr>
+            <a:lstStyle/>
+            <a:p>
+              <a:r>
+                <a:rPr lang="en-US" dirty="0"/>
+                <a:t>1</a:t>
+              </a:r>
+            </a:p>
+          </p:txBody>
+        </p:sp>
+        <p:sp>
+          <p:nvSpPr>
+            <p:cNvPr id="32" name="TextBox 31">
+              <a:extLst>
+                <a:ext uri="{FF2B5EF4-FFF2-40B4-BE49-F238E27FC236}">
+                  <a16:creationId xmlns:a16="http://schemas.microsoft.com/office/drawing/2014/main" id="{98CF6BC3-4F60-4993-9561-C78676CFD3A1}"/>
+                </a:ext>
+              </a:extLst>
+            </p:cNvPr>
+            <p:cNvSpPr txBox="1"/>
+            <p:nvPr/>
+          </p:nvSpPr>
+          <p:spPr>
+            <a:xfrm>
+              <a:off x="5092222" y="2396852"/>
+              <a:ext cx="354584" cy="369332"/>
+            </a:xfrm>
+            <a:prstGeom prst="rect">
+              <a:avLst/>
+            </a:prstGeom>
+            <a:noFill/>
+          </p:spPr>
+          <p:txBody>
+            <a:bodyPr wrap="none" rtlCol="0">
+              <a:spAutoFit/>
+            </a:bodyPr>
+            <a:lstStyle/>
+            <a:p>
+              <a:r>
+                <a:rPr lang="en-US" dirty="0"/>
+                <a:t> 1</a:t>
+              </a:r>
+            </a:p>
+          </p:txBody>
+        </p:sp>
+        <p:sp>
+          <p:nvSpPr>
+            <p:cNvPr id="34" name="TextBox 33">
+              <a:extLst>
+                <a:ext uri="{FF2B5EF4-FFF2-40B4-BE49-F238E27FC236}">
+                  <a16:creationId xmlns:a16="http://schemas.microsoft.com/office/drawing/2014/main" id="{006EF377-8717-4A6A-8084-8FC8137FA2F2}"/>
+                </a:ext>
+              </a:extLst>
+            </p:cNvPr>
+            <p:cNvSpPr txBox="1"/>
+            <p:nvPr/>
+          </p:nvSpPr>
+          <p:spPr>
+            <a:xfrm>
+              <a:off x="7711370" y="3346490"/>
+              <a:ext cx="354584" cy="369332"/>
+            </a:xfrm>
+            <a:prstGeom prst="rect">
+              <a:avLst/>
+            </a:prstGeom>
+            <a:noFill/>
+          </p:spPr>
+          <p:txBody>
+            <a:bodyPr wrap="none" rtlCol="0">
+              <a:spAutoFit/>
+            </a:bodyPr>
+            <a:lstStyle/>
+            <a:p>
+              <a:r>
+                <a:rPr lang="en-US" dirty="0"/>
+                <a:t> 1</a:t>
+              </a:r>
+            </a:p>
+          </p:txBody>
+        </p:sp>
+        <p:sp>
+          <p:nvSpPr>
+            <p:cNvPr id="35" name="TextBox 34">
+              <a:extLst>
+                <a:ext uri="{FF2B5EF4-FFF2-40B4-BE49-F238E27FC236}">
+                  <a16:creationId xmlns:a16="http://schemas.microsoft.com/office/drawing/2014/main" id="{2B2A0320-45D8-4427-949B-1CE390F36AC6}"/>
+                </a:ext>
+              </a:extLst>
+            </p:cNvPr>
+            <p:cNvSpPr txBox="1"/>
+            <p:nvPr/>
+          </p:nvSpPr>
+          <p:spPr>
+            <a:xfrm>
+              <a:off x="9849679" y="3200593"/>
+              <a:ext cx="354584" cy="369332"/>
+            </a:xfrm>
+            <a:prstGeom prst="rect">
+              <a:avLst/>
+            </a:prstGeom>
+            <a:noFill/>
+          </p:spPr>
+          <p:txBody>
+            <a:bodyPr wrap="none" rtlCol="0">
+              <a:spAutoFit/>
+            </a:bodyPr>
+            <a:lstStyle/>
+            <a:p>
+              <a:r>
+                <a:rPr lang="en-US" dirty="0"/>
+                <a:t> 1</a:t>
+              </a:r>
+            </a:p>
+          </p:txBody>
+        </p:sp>
+        <p:sp>
+          <p:nvSpPr>
+            <p:cNvPr id="37" name="TextBox 36">
+              <a:extLst>
+                <a:ext uri="{FF2B5EF4-FFF2-40B4-BE49-F238E27FC236}">
+                  <a16:creationId xmlns:a16="http://schemas.microsoft.com/office/drawing/2014/main" id="{4191E7BA-96F7-437A-93E5-115132705102}"/>
+                </a:ext>
+              </a:extLst>
+            </p:cNvPr>
+            <p:cNvSpPr txBox="1"/>
+            <p:nvPr/>
+          </p:nvSpPr>
+          <p:spPr>
+            <a:xfrm>
+              <a:off x="10337977" y="4449529"/>
+              <a:ext cx="359394" cy="369332"/>
+            </a:xfrm>
+            <a:prstGeom prst="rect">
+              <a:avLst/>
+            </a:prstGeom>
+            <a:noFill/>
+          </p:spPr>
+          <p:txBody>
+            <a:bodyPr wrap="none" rtlCol="0">
+              <a:spAutoFit/>
+            </a:bodyPr>
+            <a:lstStyle/>
+            <a:p>
+              <a:r>
+                <a:rPr lang="en-US" dirty="0"/>
+                <a:t> n</a:t>
+              </a:r>
+            </a:p>
+          </p:txBody>
+        </p:sp>
+        <p:sp>
+          <p:nvSpPr>
+            <p:cNvPr id="38" name="TextBox 37">
+              <a:extLst>
+                <a:ext uri="{FF2B5EF4-FFF2-40B4-BE49-F238E27FC236}">
+                  <a16:creationId xmlns:a16="http://schemas.microsoft.com/office/drawing/2014/main" id="{DDE97E58-A7BE-47CD-9510-3C52826A9806}"/>
+                </a:ext>
+              </a:extLst>
+            </p:cNvPr>
+            <p:cNvSpPr txBox="1"/>
+            <p:nvPr/>
+          </p:nvSpPr>
+          <p:spPr>
+            <a:xfrm>
+              <a:off x="9511640" y="1664517"/>
+              <a:ext cx="359394" cy="369332"/>
+            </a:xfrm>
+            <a:prstGeom prst="rect">
+              <a:avLst/>
+            </a:prstGeom>
+            <a:noFill/>
+          </p:spPr>
+          <p:txBody>
+            <a:bodyPr wrap="none" rtlCol="0">
+              <a:spAutoFit/>
+            </a:bodyPr>
+            <a:lstStyle/>
+            <a:p>
+              <a:r>
+                <a:rPr lang="en-US" dirty="0"/>
+                <a:t> n</a:t>
+              </a:r>
+            </a:p>
+          </p:txBody>
+        </p:sp>
+        <p:sp>
+          <p:nvSpPr>
+            <p:cNvPr id="41" name="TextBox 40">
+              <a:extLst>
+                <a:ext uri="{FF2B5EF4-FFF2-40B4-BE49-F238E27FC236}">
+                  <a16:creationId xmlns:a16="http://schemas.microsoft.com/office/drawing/2014/main" id="{5DBC0039-3A4F-4993-B7DF-145735A24EC4}"/>
+                </a:ext>
+              </a:extLst>
+            </p:cNvPr>
+            <p:cNvSpPr txBox="1"/>
+            <p:nvPr/>
+          </p:nvSpPr>
+          <p:spPr>
+            <a:xfrm>
+              <a:off x="8827907" y="1662731"/>
+              <a:ext cx="359394" cy="369332"/>
+            </a:xfrm>
+            <a:prstGeom prst="rect">
+              <a:avLst/>
+            </a:prstGeom>
+            <a:noFill/>
+          </p:spPr>
+          <p:txBody>
+            <a:bodyPr wrap="none" rtlCol="0">
+              <a:spAutoFit/>
+            </a:bodyPr>
+            <a:lstStyle/>
+            <a:p>
+              <a:r>
+                <a:rPr lang="en-US" dirty="0"/>
+                <a:t> n</a:t>
+              </a:r>
+            </a:p>
+          </p:txBody>
+        </p:sp>
       </p:grpSp>
     </p:spTree>
     <p:extLst>

</xml_diff>